<commit_message>
Added collision event to ERD
</commit_message>
<xml_diff>
--- a/COMP2160 Week 5 Demo/Assets/Docs/ERD and FSM template.pptx
+++ b/COMP2160 Week 5 Demo/Assets/Docs/ERD and FSM template.pptx
@@ -4856,8 +4856,8 @@
         </p:nvSpPr>
         <p:spPr>
           <a:xfrm>
-            <a:off x="3601568" y="1087396"/>
-            <a:ext cx="4988864" cy="4446712"/>
+            <a:off x="3601568" y="1087395"/>
+            <a:ext cx="4988864" cy="5297501"/>
           </a:xfrm>
           <a:prstGeom prst="roundRect">
             <a:avLst/>
@@ -5058,6 +5058,39 @@
             <a:r>
               <a:rPr lang="en-US" sz="1200" dirty="0"/>
               <a:t>Fire the laser</a:t>
+            </a:r>
+          </a:p>
+          <a:p>
+            <a:pPr marL="171450" indent="-171450">
+              <a:buFont typeface="Arial" panose="020B0604020202020204" pitchFamily="34" charset="0"/>
+              <a:buChar char="•"/>
+            </a:pPr>
+            <a:endParaRPr lang="en-US" sz="1200" dirty="0"/>
+          </a:p>
+          <a:p>
+            <a:r>
+              <a:rPr lang="en-US" sz="1200" dirty="0"/>
+              <a:t>On collision with enemy:</a:t>
+            </a:r>
+          </a:p>
+          <a:p>
+            <a:pPr marL="171450" indent="-171450">
+              <a:buFont typeface="Arial" panose="020B0604020202020204" pitchFamily="34" charset="0"/>
+              <a:buChar char="•"/>
+            </a:pPr>
+            <a:r>
+              <a:rPr lang="en-US" sz="1200" dirty="0"/>
+              <a:t>Destroy the ship</a:t>
+            </a:r>
+          </a:p>
+          <a:p>
+            <a:pPr marL="171450" indent="-171450">
+              <a:buFont typeface="Arial" panose="020B0604020202020204" pitchFamily="34" charset="0"/>
+              <a:buChar char="•"/>
+            </a:pPr>
+            <a:r>
+              <a:rPr lang="en-US" sz="1200" dirty="0"/>
+              <a:t>Create an explosion</a:t>
             </a:r>
           </a:p>
         </p:txBody>
@@ -5385,7 +5418,7 @@
         <p:spPr>
           <a:xfrm>
             <a:off x="1552220" y="1831139"/>
-            <a:ext cx="2289410" cy="2196951"/>
+            <a:ext cx="2289410" cy="2913319"/>
           </a:xfrm>
           <a:prstGeom prst="roundRect">
             <a:avLst/>
@@ -5480,6 +5513,45 @@
               <a:rPr lang="en-US" sz="1200" dirty="0"/>
               <a:t>Move and rotate the ship </a:t>
             </a:r>
+          </a:p>
+          <a:p>
+            <a:pPr marL="171450" indent="-171450">
+              <a:buFont typeface="Arial" panose="020B0604020202020204" pitchFamily="34" charset="0"/>
+              <a:buChar char="•"/>
+            </a:pPr>
+            <a:endParaRPr lang="en-US" sz="1200" dirty="0"/>
+          </a:p>
+          <a:p>
+            <a:r>
+              <a:rPr lang="en-US" sz="1200" dirty="0"/>
+              <a:t>On collision with enemy:</a:t>
+            </a:r>
+          </a:p>
+          <a:p>
+            <a:pPr marL="171450" indent="-171450">
+              <a:buFont typeface="Arial" panose="020B0604020202020204" pitchFamily="34" charset="0"/>
+              <a:buChar char="•"/>
+            </a:pPr>
+            <a:r>
+              <a:rPr lang="en-US" sz="1200" dirty="0"/>
+              <a:t>Destroy the ship</a:t>
+            </a:r>
+          </a:p>
+          <a:p>
+            <a:pPr marL="171450" indent="-171450">
+              <a:buFont typeface="Arial" panose="020B0604020202020204" pitchFamily="34" charset="0"/>
+              <a:buChar char="•"/>
+            </a:pPr>
+            <a:r>
+              <a:rPr lang="en-US" sz="1200" dirty="0"/>
+              <a:t>Create an explosion</a:t>
+            </a:r>
+          </a:p>
+          <a:p>
+            <a:endParaRPr lang="en-US" sz="1200" dirty="0"/>
+          </a:p>
+          <a:p>
+            <a:endParaRPr lang="en-US" sz="1200" dirty="0"/>
           </a:p>
         </p:txBody>
       </p:sp>

</xml_diff>

<commit_message>
Refactored FireLaser as FSM
</commit_message>
<xml_diff>
--- a/COMP2160 Week 5 Demo/Assets/Docs/ERD and FSM template.pptx
+++ b/COMP2160 Week 5 Demo/Assets/Docs/ERD and FSM template.pptx
@@ -6,9 +6,10 @@
   </p:sldMasterIdLst>
   <p:sldIdLst>
     <p:sldId id="256" r:id="rId5"/>
-    <p:sldId id="259" r:id="rId6"/>
-    <p:sldId id="260" r:id="rId7"/>
-    <p:sldId id="257" r:id="rId8"/>
+    <p:sldId id="257" r:id="rId6"/>
+    <p:sldId id="259" r:id="rId7"/>
+    <p:sldId id="260" r:id="rId8"/>
+    <p:sldId id="261" r:id="rId9"/>
   </p:sldIdLst>
   <p:sldSz cx="12192000" cy="6858000"/>
   <p:notesSz cx="6858000" cy="9144000"/>
@@ -4844,10 +4845,45 @@
       </p:grpSpPr>
       <p:sp>
         <p:nvSpPr>
-          <p:cNvPr id="4" name="Rounded Rectangle 3">
-            <a:extLst>
-              <a:ext uri="{FF2B5EF4-FFF2-40B4-BE49-F238E27FC236}">
-                <a16:creationId xmlns:a16="http://schemas.microsoft.com/office/drawing/2014/main" id="{064B06A3-3ADA-3B43-A4A3-F175F192D641}"/>
+          <p:cNvPr id="4" name="TextBox 3">
+            <a:extLst>
+              <a:ext uri="{FF2B5EF4-FFF2-40B4-BE49-F238E27FC236}">
+                <a16:creationId xmlns:a16="http://schemas.microsoft.com/office/drawing/2014/main" id="{BA24AE7D-97EF-BBFD-8F95-65FB6E309D5A}"/>
+              </a:ext>
+            </a:extLst>
+          </p:cNvPr>
+          <p:cNvSpPr txBox="1"/>
+          <p:nvPr/>
+        </p:nvSpPr>
+        <p:spPr>
+          <a:xfrm>
+            <a:off x="355198" y="151491"/>
+            <a:ext cx="2237728" cy="369332"/>
+          </a:xfrm>
+          <a:prstGeom prst="rect">
+            <a:avLst/>
+          </a:prstGeom>
+          <a:noFill/>
+        </p:spPr>
+        <p:txBody>
+          <a:bodyPr wrap="none" rtlCol="0">
+            <a:spAutoFit/>
+          </a:bodyPr>
+          <a:lstStyle/>
+          <a:p>
+            <a:r>
+              <a:rPr lang="en-US" b="1" dirty="0"/>
+              <a:t>Finite State Machines</a:t>
+            </a:r>
+          </a:p>
+        </p:txBody>
+      </p:sp>
+      <p:sp>
+        <p:nvSpPr>
+          <p:cNvPr id="5" name="Rounded Rectangle 4">
+            <a:extLst>
+              <a:ext uri="{FF2B5EF4-FFF2-40B4-BE49-F238E27FC236}">
+                <a16:creationId xmlns:a16="http://schemas.microsoft.com/office/drawing/2014/main" id="{948BF349-D987-054D-7D60-1D6C098D52C8}"/>
               </a:ext>
             </a:extLst>
           </p:cNvPr>
@@ -4856,8 +4892,8 @@
         </p:nvSpPr>
         <p:spPr>
           <a:xfrm>
-            <a:off x="3601568" y="1087395"/>
-            <a:ext cx="4988864" cy="5297501"/>
+            <a:off x="1731205" y="2860592"/>
+            <a:ext cx="2014566" cy="1136815"/>
           </a:xfrm>
           <a:prstGeom prst="roundRect">
             <a:avLst/>
@@ -4884,10 +4920,9 @@
           <a:p>
             <a:pPr algn="ctr"/>
             <a:r>
-              <a:rPr lang="en-US" sz="1200" b="1" dirty="0" err="1"/>
-              <a:t>PlayerControl</a:t>
-            </a:r>
-            <a:endParaRPr lang="en-US" sz="1200" b="1" dirty="0"/>
+              <a:rPr lang="en-US" sz="2000" dirty="0"/>
+              <a:t>State Name 1</a:t>
+            </a:r>
           </a:p>
           <a:p>
             <a:endParaRPr lang="en-US" sz="1200" dirty="0"/>
@@ -4895,212 +4930,62 @@
           <a:p>
             <a:r>
               <a:rPr lang="en-US" sz="1200" dirty="0"/>
-              <a:t>Params (for designer):</a:t>
-            </a:r>
-          </a:p>
-          <a:p>
-            <a:pPr marL="171450" indent="-171450">
-              <a:buFont typeface="Arial" panose="020B0604020202020204" pitchFamily="34" charset="0"/>
-              <a:buChar char="•"/>
-            </a:pPr>
-            <a:r>
-              <a:rPr lang="en-US" sz="1200" dirty="0"/>
-              <a:t>Forward movement speed</a:t>
-            </a:r>
-          </a:p>
-          <a:p>
-            <a:pPr marL="171450" indent="-171450">
-              <a:buFont typeface="Arial" panose="020B0604020202020204" pitchFamily="34" charset="0"/>
-              <a:buChar char="•"/>
-            </a:pPr>
-            <a:r>
-              <a:rPr lang="en-US" sz="1200" dirty="0"/>
-              <a:t>Turning speed</a:t>
-            </a:r>
-          </a:p>
-          <a:p>
-            <a:pPr marL="171450" indent="-171450">
-              <a:buFont typeface="Arial" panose="020B0604020202020204" pitchFamily="34" charset="0"/>
-              <a:buChar char="•"/>
-            </a:pPr>
-            <a:r>
-              <a:rPr lang="en-US" sz="1200" dirty="0"/>
-              <a:t>Laser:</a:t>
-            </a:r>
-          </a:p>
-          <a:p>
-            <a:pPr marL="628650" lvl="1" indent="-171450">
-              <a:buFont typeface="Arial" panose="020B0604020202020204" pitchFamily="34" charset="0"/>
-              <a:buChar char="•"/>
-            </a:pPr>
-            <a:r>
-              <a:rPr lang="en-US" sz="1200" dirty="0"/>
-              <a:t>Maximum fire distance</a:t>
-            </a:r>
-          </a:p>
-          <a:p>
-            <a:pPr marL="628650" lvl="1" indent="-171450">
-              <a:buFont typeface="Arial" panose="020B0604020202020204" pitchFamily="34" charset="0"/>
-              <a:buChar char="•"/>
-            </a:pPr>
-            <a:r>
-              <a:rPr lang="en-US" sz="1200" dirty="0"/>
-              <a:t>Speed of light</a:t>
-            </a:r>
-          </a:p>
-          <a:p>
-            <a:pPr marL="171450" indent="-171450">
-              <a:buFont typeface="Arial" panose="020B0604020202020204" pitchFamily="34" charset="0"/>
-              <a:buChar char="•"/>
-            </a:pPr>
-            <a:r>
-              <a:rPr lang="en-US" sz="1200" dirty="0"/>
-              <a:t>Score per enemy killed</a:t>
-            </a:r>
-          </a:p>
-          <a:p>
-            <a:pPr marL="628650" lvl="1" indent="-171450">
-              <a:buFont typeface="Arial" panose="020B0604020202020204" pitchFamily="34" charset="0"/>
-              <a:buChar char="•"/>
-            </a:pPr>
-            <a:endParaRPr lang="en-US" sz="1200" dirty="0"/>
-          </a:p>
-          <a:p>
-            <a:r>
-              <a:rPr lang="en-US" sz="1200" dirty="0"/>
-              <a:t>State:</a:t>
-            </a:r>
-          </a:p>
-          <a:p>
-            <a:pPr marL="171450" indent="-171450">
-              <a:buFont typeface="Arial" panose="020B0604020202020204" pitchFamily="34" charset="0"/>
-              <a:buChar char="•"/>
-            </a:pPr>
-            <a:r>
-              <a:rPr lang="en-US" sz="1200" dirty="0"/>
-              <a:t>Position / rotation of ship</a:t>
-            </a:r>
-          </a:p>
-          <a:p>
-            <a:pPr marL="171450" indent="-171450">
-              <a:buFont typeface="Arial" panose="020B0604020202020204" pitchFamily="34" charset="0"/>
-              <a:buChar char="•"/>
-            </a:pPr>
-            <a:r>
-              <a:rPr lang="en-US" sz="1200" dirty="0"/>
-              <a:t>State of laser: Firing / Ending</a:t>
-            </a:r>
-          </a:p>
-          <a:p>
-            <a:pPr marL="171450" indent="-171450">
-              <a:buFont typeface="Arial" panose="020B0604020202020204" pitchFamily="34" charset="0"/>
-              <a:buChar char="•"/>
-            </a:pPr>
-            <a:r>
-              <a:rPr lang="en-US" sz="1200" dirty="0"/>
-              <a:t>Distance laser has moved</a:t>
-            </a:r>
-          </a:p>
-          <a:p>
-            <a:pPr marL="171450" indent="-171450">
-              <a:buFont typeface="Arial" panose="020B0604020202020204" pitchFamily="34" charset="0"/>
-              <a:buChar char="•"/>
-            </a:pPr>
-            <a:r>
-              <a:rPr lang="en-US" sz="1200" dirty="0"/>
-              <a:t>Distance to laser target</a:t>
-            </a:r>
-          </a:p>
-          <a:p>
-            <a:pPr marL="171450" indent="-171450">
-              <a:buFont typeface="Arial" panose="020B0604020202020204" pitchFamily="34" charset="0"/>
-              <a:buChar char="•"/>
-            </a:pPr>
-            <a:r>
-              <a:rPr lang="en-US" sz="1200" dirty="0"/>
-              <a:t>Current laser target</a:t>
-            </a:r>
-          </a:p>
-          <a:p>
-            <a:pPr marL="171450" indent="-171450">
-              <a:buFont typeface="Arial" panose="020B0604020202020204" pitchFamily="34" charset="0"/>
-              <a:buChar char="•"/>
-            </a:pPr>
-            <a:r>
-              <a:rPr lang="en-US" sz="1200" dirty="0"/>
-              <a:t>Score</a:t>
-            </a:r>
-          </a:p>
-          <a:p>
-            <a:endParaRPr lang="en-US" sz="1200" dirty="0"/>
-          </a:p>
-          <a:p>
-            <a:r>
-              <a:rPr lang="en-US" sz="1200" dirty="0"/>
-              <a:t>Update:</a:t>
-            </a:r>
-          </a:p>
-          <a:p>
-            <a:pPr marL="171450" indent="-171450">
-              <a:buFont typeface="Arial" panose="020B0604020202020204" pitchFamily="34" charset="0"/>
-              <a:buChar char="•"/>
-            </a:pPr>
-            <a:r>
-              <a:rPr lang="en-US" sz="1200" dirty="0"/>
-              <a:t>Move and rotate the ship </a:t>
-            </a:r>
-          </a:p>
-          <a:p>
-            <a:pPr marL="171450" indent="-171450">
-              <a:buFont typeface="Arial" panose="020B0604020202020204" pitchFamily="34" charset="0"/>
-              <a:buChar char="•"/>
-            </a:pPr>
-            <a:r>
-              <a:rPr lang="en-US" sz="1200" dirty="0"/>
-              <a:t>Fire the laser</a:t>
-            </a:r>
-          </a:p>
-          <a:p>
-            <a:pPr marL="171450" indent="-171450">
-              <a:buFont typeface="Arial" panose="020B0604020202020204" pitchFamily="34" charset="0"/>
-              <a:buChar char="•"/>
-            </a:pPr>
-            <a:endParaRPr lang="en-US" sz="1200" dirty="0"/>
-          </a:p>
-          <a:p>
-            <a:r>
-              <a:rPr lang="en-US" sz="1200" dirty="0"/>
-              <a:t>On collision with enemy:</a:t>
-            </a:r>
-          </a:p>
-          <a:p>
-            <a:pPr marL="171450" indent="-171450">
-              <a:buFont typeface="Arial" panose="020B0604020202020204" pitchFamily="34" charset="0"/>
-              <a:buChar char="•"/>
-            </a:pPr>
-            <a:r>
-              <a:rPr lang="en-US" sz="1200" dirty="0"/>
-              <a:t>Destroy the ship</a:t>
-            </a:r>
-          </a:p>
-          <a:p>
-            <a:pPr marL="171450" indent="-171450">
-              <a:buFont typeface="Arial" panose="020B0604020202020204" pitchFamily="34" charset="0"/>
-              <a:buChar char="•"/>
-            </a:pPr>
-            <a:r>
-              <a:rPr lang="en-US" sz="1200" dirty="0"/>
-              <a:t>Create an explosion</a:t>
-            </a:r>
-          </a:p>
-        </p:txBody>
-      </p:sp>
-      <p:sp>
-        <p:nvSpPr>
-          <p:cNvPr id="25" name="TextBox 24">
-            <a:extLst>
-              <a:ext uri="{FF2B5EF4-FFF2-40B4-BE49-F238E27FC236}">
-                <a16:creationId xmlns:a16="http://schemas.microsoft.com/office/drawing/2014/main" id="{66C6CEA1-DFEF-4042-895A-E5CF0D97CB34}"/>
+              <a:t>Description of action while in state.</a:t>
+            </a:r>
+          </a:p>
+        </p:txBody>
+      </p:sp>
+      <p:cxnSp>
+        <p:nvCxnSpPr>
+          <p:cNvPr id="9" name="Straight Arrow Connector 8">
+            <a:extLst>
+              <a:ext uri="{FF2B5EF4-FFF2-40B4-BE49-F238E27FC236}">
+                <a16:creationId xmlns:a16="http://schemas.microsoft.com/office/drawing/2014/main" id="{C379F455-7089-EA43-FCAC-5D025263A1B8}"/>
+              </a:ext>
+            </a:extLst>
+          </p:cNvPr>
+          <p:cNvCxnSpPr>
+            <a:cxnSpLocks/>
+          </p:cNvCxnSpPr>
+          <p:nvPr/>
+        </p:nvCxnSpPr>
+        <p:spPr>
+          <a:xfrm>
+            <a:off x="1564849" y="2035404"/>
+            <a:ext cx="680712" cy="825188"/>
+          </a:xfrm>
+          <a:prstGeom prst="straightConnector1">
+            <a:avLst/>
+          </a:prstGeom>
+          <a:ln w="50800">
+            <a:solidFill>
+              <a:srgbClr val="FFC000"/>
+            </a:solidFill>
+            <a:prstDash val="solid"/>
+            <a:tailEnd type="triangle"/>
+          </a:ln>
+        </p:spPr>
+        <p:style>
+          <a:lnRef idx="1">
+            <a:schemeClr val="dk1"/>
+          </a:lnRef>
+          <a:fillRef idx="0">
+            <a:schemeClr val="dk1"/>
+          </a:fillRef>
+          <a:effectRef idx="0">
+            <a:schemeClr val="dk1"/>
+          </a:effectRef>
+          <a:fontRef idx="minor">
+            <a:schemeClr val="tx1"/>
+          </a:fontRef>
+        </p:style>
+      </p:cxnSp>
+      <p:sp>
+        <p:nvSpPr>
+          <p:cNvPr id="11" name="TextBox 10">
+            <a:extLst>
+              <a:ext uri="{FF2B5EF4-FFF2-40B4-BE49-F238E27FC236}">
+                <a16:creationId xmlns:a16="http://schemas.microsoft.com/office/drawing/2014/main" id="{909903AF-4BDA-FD86-E513-2EB44A65BCAF}"/>
               </a:ext>
             </a:extLst>
           </p:cNvPr>
@@ -5109,8 +4994,8 @@
         </p:nvSpPr>
         <p:spPr>
           <a:xfrm>
-            <a:off x="355198" y="151491"/>
-            <a:ext cx="4685770" cy="369332"/>
+            <a:off x="1098916" y="2218654"/>
+            <a:ext cx="632289" cy="369332"/>
           </a:xfrm>
           <a:prstGeom prst="rect">
             <a:avLst/>
@@ -5124,8 +5009,641 @@
           <a:lstStyle/>
           <a:p>
             <a:r>
-              <a:rPr lang="en-US" b="1" dirty="0"/>
-              <a:t>Entity Relationship Diagram: Before refactoring</a:t>
+              <a:rPr lang="en-US" dirty="0"/>
+              <a:t>Start</a:t>
+            </a:r>
+          </a:p>
+        </p:txBody>
+      </p:sp>
+      <p:sp>
+        <p:nvSpPr>
+          <p:cNvPr id="12" name="Rounded Rectangle 11">
+            <a:extLst>
+              <a:ext uri="{FF2B5EF4-FFF2-40B4-BE49-F238E27FC236}">
+                <a16:creationId xmlns:a16="http://schemas.microsoft.com/office/drawing/2014/main" id="{4D3F3AA8-3D36-BFFE-32E7-CDFACD4F19F6}"/>
+              </a:ext>
+            </a:extLst>
+          </p:cNvPr>
+          <p:cNvSpPr/>
+          <p:nvPr/>
+        </p:nvSpPr>
+        <p:spPr>
+          <a:xfrm>
+            <a:off x="5088717" y="1081839"/>
+            <a:ext cx="2014566" cy="1136815"/>
+          </a:xfrm>
+          <a:prstGeom prst="roundRect">
+            <a:avLst/>
+          </a:prstGeom>
+          <a:ln w="25400"/>
+        </p:spPr>
+        <p:style>
+          <a:lnRef idx="2">
+            <a:schemeClr val="accent2"/>
+          </a:lnRef>
+          <a:fillRef idx="1">
+            <a:schemeClr val="lt1"/>
+          </a:fillRef>
+          <a:effectRef idx="0">
+            <a:schemeClr val="accent2"/>
+          </a:effectRef>
+          <a:fontRef idx="minor">
+            <a:schemeClr val="dk1"/>
+          </a:fontRef>
+        </p:style>
+        <p:txBody>
+          <a:bodyPr rtlCol="0" anchor="t" anchorCtr="0"/>
+          <a:lstStyle/>
+          <a:p>
+            <a:pPr algn="ctr"/>
+            <a:r>
+              <a:rPr lang="en-US" sz="2000" dirty="0"/>
+              <a:t>State Name 2</a:t>
+            </a:r>
+          </a:p>
+          <a:p>
+            <a:endParaRPr lang="en-US" sz="1200" dirty="0"/>
+          </a:p>
+          <a:p>
+            <a:r>
+              <a:rPr lang="en-US" sz="1200" dirty="0"/>
+              <a:t>Description of action while in state.</a:t>
+            </a:r>
+          </a:p>
+        </p:txBody>
+      </p:sp>
+      <p:sp>
+        <p:nvSpPr>
+          <p:cNvPr id="13" name="Rounded Rectangle 12">
+            <a:extLst>
+              <a:ext uri="{FF2B5EF4-FFF2-40B4-BE49-F238E27FC236}">
+                <a16:creationId xmlns:a16="http://schemas.microsoft.com/office/drawing/2014/main" id="{903B335A-776B-8705-9741-F7FB2818DFF8}"/>
+              </a:ext>
+            </a:extLst>
+          </p:cNvPr>
+          <p:cNvSpPr/>
+          <p:nvPr/>
+        </p:nvSpPr>
+        <p:spPr>
+          <a:xfrm>
+            <a:off x="8446231" y="2860591"/>
+            <a:ext cx="2014566" cy="1136815"/>
+          </a:xfrm>
+          <a:prstGeom prst="roundRect">
+            <a:avLst/>
+          </a:prstGeom>
+          <a:ln w="25400"/>
+        </p:spPr>
+        <p:style>
+          <a:lnRef idx="2">
+            <a:schemeClr val="accent2"/>
+          </a:lnRef>
+          <a:fillRef idx="1">
+            <a:schemeClr val="lt1"/>
+          </a:fillRef>
+          <a:effectRef idx="0">
+            <a:schemeClr val="accent2"/>
+          </a:effectRef>
+          <a:fontRef idx="minor">
+            <a:schemeClr val="dk1"/>
+          </a:fontRef>
+        </p:style>
+        <p:txBody>
+          <a:bodyPr rtlCol="0" anchor="t" anchorCtr="0"/>
+          <a:lstStyle/>
+          <a:p>
+            <a:pPr algn="ctr"/>
+            <a:r>
+              <a:rPr lang="en-US" sz="2000" dirty="0"/>
+              <a:t>State Name 4</a:t>
+            </a:r>
+          </a:p>
+          <a:p>
+            <a:endParaRPr lang="en-US" sz="1200" dirty="0"/>
+          </a:p>
+          <a:p>
+            <a:r>
+              <a:rPr lang="en-US" sz="1200" dirty="0"/>
+              <a:t>Description of action while in state.</a:t>
+            </a:r>
+          </a:p>
+        </p:txBody>
+      </p:sp>
+      <p:sp>
+        <p:nvSpPr>
+          <p:cNvPr id="14" name="Rounded Rectangle 13">
+            <a:extLst>
+              <a:ext uri="{FF2B5EF4-FFF2-40B4-BE49-F238E27FC236}">
+                <a16:creationId xmlns:a16="http://schemas.microsoft.com/office/drawing/2014/main" id="{6284E8C9-2EC6-5CC9-A414-40089A987D57}"/>
+              </a:ext>
+            </a:extLst>
+          </p:cNvPr>
+          <p:cNvSpPr/>
+          <p:nvPr/>
+        </p:nvSpPr>
+        <p:spPr>
+          <a:xfrm>
+            <a:off x="5088717" y="4639346"/>
+            <a:ext cx="2014566" cy="1136815"/>
+          </a:xfrm>
+          <a:prstGeom prst="roundRect">
+            <a:avLst/>
+          </a:prstGeom>
+          <a:ln w="25400"/>
+        </p:spPr>
+        <p:style>
+          <a:lnRef idx="2">
+            <a:schemeClr val="accent2"/>
+          </a:lnRef>
+          <a:fillRef idx="1">
+            <a:schemeClr val="lt1"/>
+          </a:fillRef>
+          <a:effectRef idx="0">
+            <a:schemeClr val="accent2"/>
+          </a:effectRef>
+          <a:fontRef idx="minor">
+            <a:schemeClr val="dk1"/>
+          </a:fontRef>
+        </p:style>
+        <p:txBody>
+          <a:bodyPr rtlCol="0" anchor="t" anchorCtr="0"/>
+          <a:lstStyle/>
+          <a:p>
+            <a:pPr algn="ctr"/>
+            <a:r>
+              <a:rPr lang="en-US" sz="2000" dirty="0"/>
+              <a:t>State Name 3</a:t>
+            </a:r>
+          </a:p>
+          <a:p>
+            <a:endParaRPr lang="en-US" sz="1200" dirty="0"/>
+          </a:p>
+          <a:p>
+            <a:r>
+              <a:rPr lang="en-US" sz="1200" dirty="0"/>
+              <a:t>Description of action while in state.</a:t>
+            </a:r>
+          </a:p>
+        </p:txBody>
+      </p:sp>
+      <p:cxnSp>
+        <p:nvCxnSpPr>
+          <p:cNvPr id="15" name="Straight Arrow Connector 14">
+            <a:extLst>
+              <a:ext uri="{FF2B5EF4-FFF2-40B4-BE49-F238E27FC236}">
+                <a16:creationId xmlns:a16="http://schemas.microsoft.com/office/drawing/2014/main" id="{3830851E-C685-2E88-52AB-3854FB3A9F7D}"/>
+              </a:ext>
+            </a:extLst>
+          </p:cNvPr>
+          <p:cNvCxnSpPr>
+            <a:cxnSpLocks/>
+          </p:cNvCxnSpPr>
+          <p:nvPr/>
+        </p:nvCxnSpPr>
+        <p:spPr>
+          <a:xfrm flipV="1">
+            <a:off x="3745771" y="2187804"/>
+            <a:ext cx="1342946" cy="743932"/>
+          </a:xfrm>
+          <a:prstGeom prst="straightConnector1">
+            <a:avLst/>
+          </a:prstGeom>
+          <a:ln w="50800">
+            <a:solidFill>
+              <a:srgbClr val="FFC000"/>
+            </a:solidFill>
+            <a:prstDash val="solid"/>
+            <a:tailEnd type="triangle"/>
+          </a:ln>
+        </p:spPr>
+        <p:style>
+          <a:lnRef idx="1">
+            <a:schemeClr val="dk1"/>
+          </a:lnRef>
+          <a:fillRef idx="0">
+            <a:schemeClr val="dk1"/>
+          </a:fillRef>
+          <a:effectRef idx="0">
+            <a:schemeClr val="dk1"/>
+          </a:effectRef>
+          <a:fontRef idx="minor">
+            <a:schemeClr val="tx1"/>
+          </a:fontRef>
+        </p:style>
+      </p:cxnSp>
+      <p:cxnSp>
+        <p:nvCxnSpPr>
+          <p:cNvPr id="19" name="Straight Arrow Connector 18">
+            <a:extLst>
+              <a:ext uri="{FF2B5EF4-FFF2-40B4-BE49-F238E27FC236}">
+                <a16:creationId xmlns:a16="http://schemas.microsoft.com/office/drawing/2014/main" id="{D84A2761-1251-B476-8928-EFADE29454D8}"/>
+              </a:ext>
+            </a:extLst>
+          </p:cNvPr>
+          <p:cNvCxnSpPr>
+            <a:cxnSpLocks/>
+          </p:cNvCxnSpPr>
+          <p:nvPr/>
+        </p:nvCxnSpPr>
+        <p:spPr>
+          <a:xfrm>
+            <a:off x="3745770" y="3936831"/>
+            <a:ext cx="1342947" cy="814278"/>
+          </a:xfrm>
+          <a:prstGeom prst="straightConnector1">
+            <a:avLst/>
+          </a:prstGeom>
+          <a:ln w="50800">
+            <a:solidFill>
+              <a:srgbClr val="FFC000"/>
+            </a:solidFill>
+            <a:prstDash val="solid"/>
+            <a:tailEnd type="triangle"/>
+          </a:ln>
+        </p:spPr>
+        <p:style>
+          <a:lnRef idx="1">
+            <a:schemeClr val="dk1"/>
+          </a:lnRef>
+          <a:fillRef idx="0">
+            <a:schemeClr val="dk1"/>
+          </a:fillRef>
+          <a:effectRef idx="0">
+            <a:schemeClr val="dk1"/>
+          </a:effectRef>
+          <a:fontRef idx="minor">
+            <a:schemeClr val="tx1"/>
+          </a:fontRef>
+        </p:style>
+      </p:cxnSp>
+      <p:sp>
+        <p:nvSpPr>
+          <p:cNvPr id="21" name="TextBox 20">
+            <a:extLst>
+              <a:ext uri="{FF2B5EF4-FFF2-40B4-BE49-F238E27FC236}">
+                <a16:creationId xmlns:a16="http://schemas.microsoft.com/office/drawing/2014/main" id="{F4B96A60-176F-2BD4-A756-71CCFB00738F}"/>
+              </a:ext>
+            </a:extLst>
+          </p:cNvPr>
+          <p:cNvSpPr txBox="1"/>
+          <p:nvPr/>
+        </p:nvSpPr>
+        <p:spPr>
+          <a:xfrm>
+            <a:off x="3428840" y="4292262"/>
+            <a:ext cx="1123064" cy="738664"/>
+          </a:xfrm>
+          <a:prstGeom prst="rect">
+            <a:avLst/>
+          </a:prstGeom>
+          <a:noFill/>
+        </p:spPr>
+        <p:txBody>
+          <a:bodyPr wrap="none" rtlCol="0">
+            <a:spAutoFit/>
+          </a:bodyPr>
+          <a:lstStyle/>
+          <a:p>
+            <a:r>
+              <a:rPr lang="en-US" sz="1400" dirty="0"/>
+              <a:t>Condition or</a:t>
+            </a:r>
+          </a:p>
+          <a:p>
+            <a:r>
+              <a:rPr lang="en-US" sz="1400" dirty="0"/>
+              <a:t>event causes</a:t>
+            </a:r>
+          </a:p>
+          <a:p>
+            <a:r>
+              <a:rPr lang="en-US" sz="1400" dirty="0"/>
+              <a:t>transition</a:t>
+            </a:r>
+          </a:p>
+        </p:txBody>
+      </p:sp>
+      <p:cxnSp>
+        <p:nvCxnSpPr>
+          <p:cNvPr id="22" name="Straight Arrow Connector 21">
+            <a:extLst>
+              <a:ext uri="{FF2B5EF4-FFF2-40B4-BE49-F238E27FC236}">
+                <a16:creationId xmlns:a16="http://schemas.microsoft.com/office/drawing/2014/main" id="{54FBC9BB-0A9F-071D-F9DC-0A6B6FABCE61}"/>
+              </a:ext>
+            </a:extLst>
+          </p:cNvPr>
+          <p:cNvCxnSpPr>
+            <a:cxnSpLocks/>
+          </p:cNvCxnSpPr>
+          <p:nvPr/>
+        </p:nvCxnSpPr>
+        <p:spPr>
+          <a:xfrm>
+            <a:off x="7042287" y="2301437"/>
+            <a:ext cx="1342946" cy="828261"/>
+          </a:xfrm>
+          <a:prstGeom prst="straightConnector1">
+            <a:avLst/>
+          </a:prstGeom>
+          <a:ln w="50800">
+            <a:solidFill>
+              <a:srgbClr val="FFC000"/>
+            </a:solidFill>
+            <a:prstDash val="solid"/>
+            <a:tailEnd type="triangle"/>
+          </a:ln>
+        </p:spPr>
+        <p:style>
+          <a:lnRef idx="1">
+            <a:schemeClr val="dk1"/>
+          </a:lnRef>
+          <a:fillRef idx="0">
+            <a:schemeClr val="dk1"/>
+          </a:fillRef>
+          <a:effectRef idx="0">
+            <a:schemeClr val="dk1"/>
+          </a:effectRef>
+          <a:fontRef idx="minor">
+            <a:schemeClr val="tx1"/>
+          </a:fontRef>
+        </p:style>
+      </p:cxnSp>
+      <p:sp>
+        <p:nvSpPr>
+          <p:cNvPr id="25" name="TextBox 24">
+            <a:extLst>
+              <a:ext uri="{FF2B5EF4-FFF2-40B4-BE49-F238E27FC236}">
+                <a16:creationId xmlns:a16="http://schemas.microsoft.com/office/drawing/2014/main" id="{484B4C33-CE25-E19F-FF35-268FCBB91E61}"/>
+              </a:ext>
+            </a:extLst>
+          </p:cNvPr>
+          <p:cNvSpPr txBox="1"/>
+          <p:nvPr/>
+        </p:nvSpPr>
+        <p:spPr>
+          <a:xfrm>
+            <a:off x="3380660" y="1978271"/>
+            <a:ext cx="1123064" cy="738664"/>
+          </a:xfrm>
+          <a:prstGeom prst="rect">
+            <a:avLst/>
+          </a:prstGeom>
+          <a:noFill/>
+        </p:spPr>
+        <p:txBody>
+          <a:bodyPr wrap="none" rtlCol="0">
+            <a:spAutoFit/>
+          </a:bodyPr>
+          <a:lstStyle/>
+          <a:p>
+            <a:r>
+              <a:rPr lang="en-US" sz="1400" dirty="0"/>
+              <a:t>Condition or</a:t>
+            </a:r>
+          </a:p>
+          <a:p>
+            <a:r>
+              <a:rPr lang="en-US" sz="1400" dirty="0"/>
+              <a:t>event causes</a:t>
+            </a:r>
+          </a:p>
+          <a:p>
+            <a:r>
+              <a:rPr lang="en-US" sz="1400" dirty="0"/>
+              <a:t>transition</a:t>
+            </a:r>
+          </a:p>
+        </p:txBody>
+      </p:sp>
+      <p:cxnSp>
+        <p:nvCxnSpPr>
+          <p:cNvPr id="26" name="Straight Arrow Connector 25">
+            <a:extLst>
+              <a:ext uri="{FF2B5EF4-FFF2-40B4-BE49-F238E27FC236}">
+                <a16:creationId xmlns:a16="http://schemas.microsoft.com/office/drawing/2014/main" id="{BF49A70E-3A39-3678-66C9-DE12207B0AC5}"/>
+              </a:ext>
+            </a:extLst>
+          </p:cNvPr>
+          <p:cNvCxnSpPr>
+            <a:cxnSpLocks/>
+            <a:stCxn id="14" idx="0"/>
+            <a:endCxn id="12" idx="2"/>
+          </p:cNvCxnSpPr>
+          <p:nvPr/>
+        </p:nvCxnSpPr>
+        <p:spPr>
+          <a:xfrm flipV="1">
+            <a:off x="6096000" y="2218654"/>
+            <a:ext cx="0" cy="2420692"/>
+          </a:xfrm>
+          <a:prstGeom prst="straightConnector1">
+            <a:avLst/>
+          </a:prstGeom>
+          <a:ln w="50800">
+            <a:solidFill>
+              <a:srgbClr val="FFC000"/>
+            </a:solidFill>
+            <a:prstDash val="solid"/>
+            <a:tailEnd type="triangle"/>
+          </a:ln>
+        </p:spPr>
+        <p:style>
+          <a:lnRef idx="1">
+            <a:schemeClr val="dk1"/>
+          </a:lnRef>
+          <a:fillRef idx="0">
+            <a:schemeClr val="dk1"/>
+          </a:fillRef>
+          <a:effectRef idx="0">
+            <a:schemeClr val="dk1"/>
+          </a:effectRef>
+          <a:fontRef idx="minor">
+            <a:schemeClr val="tx1"/>
+          </a:fontRef>
+        </p:style>
+      </p:cxnSp>
+      <p:cxnSp>
+        <p:nvCxnSpPr>
+          <p:cNvPr id="29" name="Straight Arrow Connector 28">
+            <a:extLst>
+              <a:ext uri="{FF2B5EF4-FFF2-40B4-BE49-F238E27FC236}">
+                <a16:creationId xmlns:a16="http://schemas.microsoft.com/office/drawing/2014/main" id="{246EBB56-9850-3514-A037-F44AA10E7277}"/>
+              </a:ext>
+            </a:extLst>
+          </p:cNvPr>
+          <p:cNvCxnSpPr>
+            <a:cxnSpLocks/>
+          </p:cNvCxnSpPr>
+          <p:nvPr/>
+        </p:nvCxnSpPr>
+        <p:spPr>
+          <a:xfrm flipH="1" flipV="1">
+            <a:off x="7237327" y="1650246"/>
+            <a:ext cx="1736991" cy="1127923"/>
+          </a:xfrm>
+          <a:prstGeom prst="straightConnector1">
+            <a:avLst/>
+          </a:prstGeom>
+          <a:ln w="50800">
+            <a:solidFill>
+              <a:srgbClr val="FFC000"/>
+            </a:solidFill>
+            <a:prstDash val="solid"/>
+            <a:tailEnd type="triangle"/>
+          </a:ln>
+        </p:spPr>
+        <p:style>
+          <a:lnRef idx="1">
+            <a:schemeClr val="dk1"/>
+          </a:lnRef>
+          <a:fillRef idx="0">
+            <a:schemeClr val="dk1"/>
+          </a:fillRef>
+          <a:effectRef idx="0">
+            <a:schemeClr val="dk1"/>
+          </a:effectRef>
+          <a:fontRef idx="minor">
+            <a:schemeClr val="tx1"/>
+          </a:fontRef>
+        </p:style>
+      </p:cxnSp>
+      <p:sp>
+        <p:nvSpPr>
+          <p:cNvPr id="33" name="TextBox 32">
+            <a:extLst>
+              <a:ext uri="{FF2B5EF4-FFF2-40B4-BE49-F238E27FC236}">
+                <a16:creationId xmlns:a16="http://schemas.microsoft.com/office/drawing/2014/main" id="{140881F9-B865-4F0A-CF3C-666EFF14D845}"/>
+              </a:ext>
+            </a:extLst>
+          </p:cNvPr>
+          <p:cNvSpPr txBox="1"/>
+          <p:nvPr/>
+        </p:nvSpPr>
+        <p:spPr>
+          <a:xfrm>
+            <a:off x="4989415" y="3045258"/>
+            <a:ext cx="1123064" cy="738664"/>
+          </a:xfrm>
+          <a:prstGeom prst="rect">
+            <a:avLst/>
+          </a:prstGeom>
+          <a:noFill/>
+        </p:spPr>
+        <p:txBody>
+          <a:bodyPr wrap="none" rtlCol="0">
+            <a:spAutoFit/>
+          </a:bodyPr>
+          <a:lstStyle/>
+          <a:p>
+            <a:r>
+              <a:rPr lang="en-US" sz="1400" dirty="0"/>
+              <a:t>Condition or</a:t>
+            </a:r>
+          </a:p>
+          <a:p>
+            <a:r>
+              <a:rPr lang="en-US" sz="1400" dirty="0"/>
+              <a:t>event causes</a:t>
+            </a:r>
+          </a:p>
+          <a:p>
+            <a:r>
+              <a:rPr lang="en-US" sz="1400" dirty="0"/>
+              <a:t>transition</a:t>
+            </a:r>
+          </a:p>
+        </p:txBody>
+      </p:sp>
+      <p:sp>
+        <p:nvSpPr>
+          <p:cNvPr id="34" name="TextBox 33">
+            <a:extLst>
+              <a:ext uri="{FF2B5EF4-FFF2-40B4-BE49-F238E27FC236}">
+                <a16:creationId xmlns:a16="http://schemas.microsoft.com/office/drawing/2014/main" id="{ECAFD697-AB5B-577D-8C72-6B376D36C132}"/>
+              </a:ext>
+            </a:extLst>
+          </p:cNvPr>
+          <p:cNvSpPr txBox="1"/>
+          <p:nvPr/>
+        </p:nvSpPr>
+        <p:spPr>
+          <a:xfrm>
+            <a:off x="8062773" y="1541473"/>
+            <a:ext cx="1123064" cy="738664"/>
+          </a:xfrm>
+          <a:prstGeom prst="rect">
+            <a:avLst/>
+          </a:prstGeom>
+          <a:noFill/>
+        </p:spPr>
+        <p:txBody>
+          <a:bodyPr wrap="none" rtlCol="0">
+            <a:spAutoFit/>
+          </a:bodyPr>
+          <a:lstStyle/>
+          <a:p>
+            <a:r>
+              <a:rPr lang="en-US" sz="1400" dirty="0"/>
+              <a:t>Condition or</a:t>
+            </a:r>
+          </a:p>
+          <a:p>
+            <a:r>
+              <a:rPr lang="en-US" sz="1400" dirty="0"/>
+              <a:t>event causes</a:t>
+            </a:r>
+          </a:p>
+          <a:p>
+            <a:r>
+              <a:rPr lang="en-US" sz="1400" dirty="0"/>
+              <a:t>transition</a:t>
+            </a:r>
+          </a:p>
+        </p:txBody>
+      </p:sp>
+      <p:sp>
+        <p:nvSpPr>
+          <p:cNvPr id="35" name="TextBox 34">
+            <a:extLst>
+              <a:ext uri="{FF2B5EF4-FFF2-40B4-BE49-F238E27FC236}">
+                <a16:creationId xmlns:a16="http://schemas.microsoft.com/office/drawing/2014/main" id="{CFD0B0BA-F2F8-8BB2-AB07-6BCF9165C9D2}"/>
+              </a:ext>
+            </a:extLst>
+          </p:cNvPr>
+          <p:cNvSpPr txBox="1"/>
+          <p:nvPr/>
+        </p:nvSpPr>
+        <p:spPr>
+          <a:xfrm>
+            <a:off x="6688834" y="2715567"/>
+            <a:ext cx="1123064" cy="738664"/>
+          </a:xfrm>
+          <a:prstGeom prst="rect">
+            <a:avLst/>
+          </a:prstGeom>
+          <a:noFill/>
+        </p:spPr>
+        <p:txBody>
+          <a:bodyPr wrap="none" rtlCol="0">
+            <a:spAutoFit/>
+          </a:bodyPr>
+          <a:lstStyle/>
+          <a:p>
+            <a:r>
+              <a:rPr lang="en-US" sz="1400" dirty="0"/>
+              <a:t>Condition or</a:t>
+            </a:r>
+          </a:p>
+          <a:p>
+            <a:r>
+              <a:rPr lang="en-US" sz="1400" dirty="0"/>
+              <a:t>event causes</a:t>
+            </a:r>
+          </a:p>
+          <a:p>
+            <a:r>
+              <a:rPr lang="en-US" sz="1400" dirty="0"/>
+              <a:t>transition</a:t>
             </a:r>
           </a:p>
         </p:txBody>
@@ -5133,7 +5651,7 @@
     </p:spTree>
     <p:extLst>
       <p:ext uri="{BB962C8B-B14F-4D97-AF65-F5344CB8AC3E}">
-        <p14:creationId xmlns:p14="http://schemas.microsoft.com/office/powerpoint/2010/main" val="1358887530"/>
+        <p14:creationId xmlns:p14="http://schemas.microsoft.com/office/powerpoint/2010/main" val="779645640"/>
       </p:ext>
     </p:extLst>
   </p:cSld>
@@ -5162,45 +5680,10 @@
       </p:grpSpPr>
       <p:sp>
         <p:nvSpPr>
-          <p:cNvPr id="25" name="TextBox 24">
-            <a:extLst>
-              <a:ext uri="{FF2B5EF4-FFF2-40B4-BE49-F238E27FC236}">
-                <a16:creationId xmlns:a16="http://schemas.microsoft.com/office/drawing/2014/main" id="{66C6CEA1-DFEF-4042-895A-E5CF0D97CB34}"/>
-              </a:ext>
-            </a:extLst>
-          </p:cNvPr>
-          <p:cNvSpPr txBox="1"/>
-          <p:nvPr/>
-        </p:nvSpPr>
-        <p:spPr>
-          <a:xfrm>
-            <a:off x="355198" y="151491"/>
-            <a:ext cx="4541564" cy="369332"/>
-          </a:xfrm>
-          <a:prstGeom prst="rect">
-            <a:avLst/>
-          </a:prstGeom>
-          <a:noFill/>
-        </p:spPr>
-        <p:txBody>
-          <a:bodyPr wrap="none" rtlCol="0">
-            <a:spAutoFit/>
-          </a:bodyPr>
-          <a:lstStyle/>
-          <a:p>
-            <a:r>
-              <a:rPr lang="en-US" b="1" dirty="0"/>
-              <a:t>Entity Relationship Diagram: After refactoring</a:t>
-            </a:r>
-          </a:p>
-        </p:txBody>
-      </p:sp>
-      <p:sp>
-        <p:nvSpPr>
-          <p:cNvPr id="2" name="Rounded Rectangle 1">
-            <a:extLst>
-              <a:ext uri="{FF2B5EF4-FFF2-40B4-BE49-F238E27FC236}">
-                <a16:creationId xmlns:a16="http://schemas.microsoft.com/office/drawing/2014/main" id="{A1D93B66-ECF3-39A4-1D60-934CFC20C1A9}"/>
+          <p:cNvPr id="4" name="Rounded Rectangle 3">
+            <a:extLst>
+              <a:ext uri="{FF2B5EF4-FFF2-40B4-BE49-F238E27FC236}">
+                <a16:creationId xmlns:a16="http://schemas.microsoft.com/office/drawing/2014/main" id="{064B06A3-3ADA-3B43-A4A3-F175F192D641}"/>
               </a:ext>
             </a:extLst>
           </p:cNvPr>
@@ -5209,59 +5692,8 @@
         </p:nvSpPr>
         <p:spPr>
           <a:xfrm>
-            <a:off x="1317859" y="1198255"/>
-            <a:ext cx="5340411" cy="4240437"/>
-          </a:xfrm>
-          <a:prstGeom prst="roundRect">
-            <a:avLst/>
-          </a:prstGeom>
-          <a:noFill/>
-          <a:ln w="25400">
-            <a:prstDash val="dash"/>
-          </a:ln>
-        </p:spPr>
-        <p:style>
-          <a:lnRef idx="2">
-            <a:schemeClr val="accent6"/>
-          </a:lnRef>
-          <a:fillRef idx="1">
-            <a:schemeClr val="lt1"/>
-          </a:fillRef>
-          <a:effectRef idx="0">
-            <a:schemeClr val="accent6"/>
-          </a:effectRef>
-          <a:fontRef idx="minor">
-            <a:schemeClr val="dk1"/>
-          </a:fontRef>
-        </p:style>
-        <p:txBody>
-          <a:bodyPr rtlCol="0" anchor="t" anchorCtr="0"/>
-          <a:lstStyle/>
-          <a:p>
-            <a:pPr algn="ctr"/>
-            <a:r>
-              <a:rPr lang="en-US" dirty="0"/>
-              <a:t>Ship</a:t>
-            </a:r>
-          </a:p>
-        </p:txBody>
-      </p:sp>
-      <p:sp>
-        <p:nvSpPr>
-          <p:cNvPr id="3" name="Rounded Rectangle 2">
-            <a:extLst>
-              <a:ext uri="{FF2B5EF4-FFF2-40B4-BE49-F238E27FC236}">
-                <a16:creationId xmlns:a16="http://schemas.microsoft.com/office/drawing/2014/main" id="{1BDECC10-2855-42A0-B6A6-CCE66BB527F7}"/>
-              </a:ext>
-            </a:extLst>
-          </p:cNvPr>
-          <p:cNvSpPr/>
-          <p:nvPr/>
-        </p:nvSpPr>
-        <p:spPr>
-          <a:xfrm>
-            <a:off x="4140717" y="1791650"/>
-            <a:ext cx="2289410" cy="3344893"/>
+            <a:off x="3601568" y="1087395"/>
+            <a:ext cx="4988864" cy="5297501"/>
           </a:xfrm>
           <a:prstGeom prst="roundRect">
             <a:avLst/>
@@ -5288,9 +5720,12 @@
           <a:p>
             <a:pPr algn="ctr"/>
             <a:r>
-              <a:rPr lang="en-US" sz="1200" b="1" dirty="0"/>
-              <a:t>Fire Lasers</a:t>
-            </a:r>
+              <a:rPr lang="en-US" sz="1200" b="1" dirty="0" err="1"/>
+              <a:t>PlayerControl</a:t>
+            </a:r>
+            <a:endParaRPr lang="en-US" sz="1200" b="1" dirty="0"/>
+          </a:p>
+          <a:p>
             <a:endParaRPr lang="en-US" sz="1200" dirty="0"/>
           </a:p>
           <a:p>
@@ -5306,7 +5741,7 @@
             </a:pPr>
             <a:r>
               <a:rPr lang="en-US" sz="1200" dirty="0"/>
-              <a:t>Maximum fire distance</a:t>
+              <a:t>Forward movement speed</a:t>
             </a:r>
           </a:p>
           <a:p>
@@ -5316,7 +5751,47 @@
             </a:pPr>
             <a:r>
               <a:rPr lang="en-US" sz="1200" dirty="0"/>
+              <a:t>Turning speed</a:t>
+            </a:r>
+          </a:p>
+          <a:p>
+            <a:pPr marL="171450" indent="-171450">
+              <a:buFont typeface="Arial" panose="020B0604020202020204" pitchFamily="34" charset="0"/>
+              <a:buChar char="•"/>
+            </a:pPr>
+            <a:r>
+              <a:rPr lang="en-US" sz="1200" dirty="0"/>
+              <a:t>Laser:</a:t>
+            </a:r>
+          </a:p>
+          <a:p>
+            <a:pPr marL="628650" lvl="1" indent="-171450">
+              <a:buFont typeface="Arial" panose="020B0604020202020204" pitchFamily="34" charset="0"/>
+              <a:buChar char="•"/>
+            </a:pPr>
+            <a:r>
+              <a:rPr lang="en-US" sz="1200" dirty="0"/>
+              <a:t>Maximum fire distance</a:t>
+            </a:r>
+          </a:p>
+          <a:p>
+            <a:pPr marL="628650" lvl="1" indent="-171450">
+              <a:buFont typeface="Arial" panose="020B0604020202020204" pitchFamily="34" charset="0"/>
+              <a:buChar char="•"/>
+            </a:pPr>
+            <a:r>
+              <a:rPr lang="en-US" sz="1200" dirty="0"/>
               <a:t>Speed of light</a:t>
+            </a:r>
+          </a:p>
+          <a:p>
+            <a:pPr marL="171450" indent="-171450">
+              <a:buFont typeface="Arial" panose="020B0604020202020204" pitchFamily="34" charset="0"/>
+              <a:buChar char="•"/>
+            </a:pPr>
+            <a:r>
+              <a:rPr lang="en-US" sz="1200" dirty="0"/>
+              <a:t>Score per enemy killed</a:t>
             </a:r>
           </a:p>
           <a:p>
@@ -5339,7 +5814,7 @@
             </a:pPr>
             <a:r>
               <a:rPr lang="en-US" sz="1200" dirty="0"/>
-              <a:t>State of laser: Firing / Ending</a:t>
+              <a:t>Position / rotation of ship</a:t>
             </a:r>
           </a:p>
           <a:p>
@@ -5349,7 +5824,7 @@
             </a:pPr>
             <a:r>
               <a:rPr lang="en-US" sz="1200" dirty="0"/>
-              <a:t>Distance laser has moved</a:t>
+              <a:t>State of laser: Firing / Ending</a:t>
             </a:r>
           </a:p>
           <a:p>
@@ -5359,7 +5834,7 @@
             </a:pPr>
             <a:r>
               <a:rPr lang="en-US" sz="1200" dirty="0"/>
-              <a:t>Distance to laser target</a:t>
+              <a:t>Distance laser has moved</a:t>
             </a:r>
           </a:p>
           <a:p>
@@ -5369,16 +5844,7 @@
             </a:pPr>
             <a:r>
               <a:rPr lang="en-US" sz="1200" dirty="0"/>
-              <a:t>Current laser target</a:t>
-            </a:r>
-          </a:p>
-          <a:p>
-            <a:endParaRPr lang="en-US" sz="1200" dirty="0"/>
-          </a:p>
-          <a:p>
-            <a:r>
-              <a:rPr lang="en-US" sz="1200" dirty="0"/>
-              <a:t>Update:</a:t>
+              <a:t>Distance to laser target</a:t>
             </a:r>
           </a:p>
           <a:p>
@@ -5388,7 +5854,7 @@
             </a:pPr>
             <a:r>
               <a:rPr lang="en-US" sz="1200" dirty="0"/>
-              <a:t>Update the state of the laser</a:t>
+              <a:t>Current laser target</a:t>
             </a:r>
           </a:p>
           <a:p>
@@ -5398,62 +5864,16 @@
             </a:pPr>
             <a:r>
               <a:rPr lang="en-US" sz="1200" dirty="0"/>
-              <a:t>Destroy hit enemies</a:t>
-            </a:r>
-          </a:p>
-        </p:txBody>
-      </p:sp>
-      <p:sp>
-        <p:nvSpPr>
-          <p:cNvPr id="5" name="Rounded Rectangle 4">
-            <a:extLst>
-              <a:ext uri="{FF2B5EF4-FFF2-40B4-BE49-F238E27FC236}">
-                <a16:creationId xmlns:a16="http://schemas.microsoft.com/office/drawing/2014/main" id="{E516955E-86E5-404C-F5B4-5EC4F52983F6}"/>
-              </a:ext>
-            </a:extLst>
-          </p:cNvPr>
-          <p:cNvSpPr/>
-          <p:nvPr/>
-        </p:nvSpPr>
-        <p:spPr>
-          <a:xfrm>
-            <a:off x="1552220" y="1831139"/>
-            <a:ext cx="2289410" cy="2913319"/>
-          </a:xfrm>
-          <a:prstGeom prst="roundRect">
-            <a:avLst/>
-          </a:prstGeom>
-          <a:ln w="25400"/>
-        </p:spPr>
-        <p:style>
-          <a:lnRef idx="2">
-            <a:schemeClr val="accent2"/>
-          </a:lnRef>
-          <a:fillRef idx="1">
-            <a:schemeClr val="lt1"/>
-          </a:fillRef>
-          <a:effectRef idx="0">
-            <a:schemeClr val="accent2"/>
-          </a:effectRef>
-          <a:fontRef idx="minor">
-            <a:schemeClr val="dk1"/>
-          </a:fontRef>
-        </p:style>
-        <p:txBody>
-          <a:bodyPr rtlCol="0" anchor="t" anchorCtr="0"/>
-          <a:lstStyle/>
-          <a:p>
-            <a:pPr algn="ctr"/>
-            <a:r>
-              <a:rPr lang="en-US" sz="1200" b="1" dirty="0"/>
-              <a:t>Player Move</a:t>
-            </a:r>
+              <a:t>Score</a:t>
+            </a:r>
+          </a:p>
+          <a:p>
             <a:endParaRPr lang="en-US" sz="1200" dirty="0"/>
           </a:p>
           <a:p>
             <a:r>
               <a:rPr lang="en-US" sz="1200" dirty="0"/>
-              <a:t>Params (for designer):</a:t>
+              <a:t>Update:</a:t>
             </a:r>
           </a:p>
           <a:p>
@@ -5463,7 +5883,7 @@
             </a:pPr>
             <a:r>
               <a:rPr lang="en-US" sz="1200" dirty="0"/>
-              <a:t>Forward movement speed</a:t>
+              <a:t>Move and rotate the ship </a:t>
             </a:r>
           </a:p>
           <a:p>
@@ -5473,45 +5893,7 @@
             </a:pPr>
             <a:r>
               <a:rPr lang="en-US" sz="1200" dirty="0"/>
-              <a:t>Turning speed</a:t>
-            </a:r>
-          </a:p>
-          <a:p>
-            <a:endParaRPr lang="en-US" sz="1200" dirty="0"/>
-          </a:p>
-          <a:p>
-            <a:r>
-              <a:rPr lang="en-US" sz="1200" dirty="0"/>
-              <a:t>State:</a:t>
-            </a:r>
-          </a:p>
-          <a:p>
-            <a:pPr marL="171450" indent="-171450">
-              <a:buFont typeface="Arial" panose="020B0604020202020204" pitchFamily="34" charset="0"/>
-              <a:buChar char="•"/>
-            </a:pPr>
-            <a:r>
-              <a:rPr lang="en-US" sz="1200" dirty="0"/>
-              <a:t>Position / rotation of ship</a:t>
-            </a:r>
-          </a:p>
-          <a:p>
-            <a:endParaRPr lang="en-US" sz="1200" dirty="0"/>
-          </a:p>
-          <a:p>
-            <a:r>
-              <a:rPr lang="en-US" sz="1200" dirty="0"/>
-              <a:t>Update:</a:t>
-            </a:r>
-          </a:p>
-          <a:p>
-            <a:pPr marL="171450" indent="-171450">
-              <a:buFont typeface="Arial" panose="020B0604020202020204" pitchFamily="34" charset="0"/>
-              <a:buChar char="•"/>
-            </a:pPr>
-            <a:r>
-              <a:rPr lang="en-US" sz="1200" dirty="0"/>
-              <a:t>Move and rotate the ship </a:t>
+              <a:t>Fire the laser</a:t>
             </a:r>
           </a:p>
           <a:p>
@@ -5547,158 +5929,14 @@
               <a:t>Create an explosion</a:t>
             </a:r>
           </a:p>
-          <a:p>
-            <a:endParaRPr lang="en-US" sz="1200" dirty="0"/>
-          </a:p>
-          <a:p>
-            <a:endParaRPr lang="en-US" sz="1200" dirty="0"/>
-          </a:p>
-        </p:txBody>
-      </p:sp>
-      <p:sp>
-        <p:nvSpPr>
-          <p:cNvPr id="6" name="Rounded Rectangle 5">
-            <a:extLst>
-              <a:ext uri="{FF2B5EF4-FFF2-40B4-BE49-F238E27FC236}">
-                <a16:creationId xmlns:a16="http://schemas.microsoft.com/office/drawing/2014/main" id="{5756FC55-E973-15D6-1CBF-90F064D7FFA4}"/>
-              </a:ext>
-            </a:extLst>
-          </p:cNvPr>
-          <p:cNvSpPr/>
-          <p:nvPr/>
-        </p:nvSpPr>
-        <p:spPr>
-          <a:xfrm>
-            <a:off x="8258870" y="1019216"/>
-            <a:ext cx="2289411" cy="1382078"/>
-          </a:xfrm>
-          <a:prstGeom prst="roundRect">
-            <a:avLst/>
-          </a:prstGeom>
-          <a:ln w="25400">
-            <a:solidFill>
-              <a:schemeClr val="accent6"/>
-            </a:solidFill>
-          </a:ln>
-        </p:spPr>
-        <p:style>
-          <a:lnRef idx="2">
-            <a:schemeClr val="accent2"/>
-          </a:lnRef>
-          <a:fillRef idx="1">
-            <a:schemeClr val="lt1"/>
-          </a:fillRef>
-          <a:effectRef idx="0">
-            <a:schemeClr val="accent2"/>
-          </a:effectRef>
-          <a:fontRef idx="minor">
-            <a:schemeClr val="dk1"/>
-          </a:fontRef>
-        </p:style>
-        <p:txBody>
-          <a:bodyPr rtlCol="0" anchor="t" anchorCtr="0"/>
-          <a:lstStyle/>
-          <a:p>
-            <a:pPr algn="ctr"/>
-            <a:r>
-              <a:rPr lang="en-US" sz="1200" b="1" dirty="0"/>
-              <a:t>Scorekeeper</a:t>
-            </a:r>
-            <a:endParaRPr lang="en-US" sz="1200" dirty="0"/>
-          </a:p>
-          <a:p>
-            <a:r>
-              <a:rPr lang="en-US" sz="1200" dirty="0"/>
-              <a:t>Params (for designer):</a:t>
-            </a:r>
-          </a:p>
-          <a:p>
-            <a:pPr marL="171450" indent="-171450">
-              <a:buFont typeface="Arial" panose="020B0604020202020204" pitchFamily="34" charset="0"/>
-              <a:buChar char="•"/>
-            </a:pPr>
-            <a:r>
-              <a:rPr lang="en-US" sz="1200" dirty="0"/>
-              <a:t>Score per enemy killed</a:t>
-            </a:r>
-          </a:p>
-          <a:p>
-            <a:endParaRPr lang="en-US" sz="1200" dirty="0"/>
-          </a:p>
-          <a:p>
-            <a:r>
-              <a:rPr lang="en-US" sz="1200" dirty="0"/>
-              <a:t>State:</a:t>
-            </a:r>
-          </a:p>
-          <a:p>
-            <a:pPr marL="171450" indent="-171450">
-              <a:buFont typeface="Arial" panose="020B0604020202020204" pitchFamily="34" charset="0"/>
-              <a:buChar char="•"/>
-            </a:pPr>
-            <a:r>
-              <a:rPr lang="en-US" sz="1200" dirty="0"/>
-              <a:t>Current score</a:t>
-            </a:r>
-          </a:p>
-          <a:p>
-            <a:endParaRPr lang="en-US" sz="1200" dirty="0"/>
-          </a:p>
-          <a:p>
-            <a:endParaRPr lang="en-US" sz="1200" dirty="0"/>
-          </a:p>
-        </p:txBody>
-      </p:sp>
-      <p:cxnSp>
-        <p:nvCxnSpPr>
-          <p:cNvPr id="7" name="Straight Arrow Connector 6">
-            <a:extLst>
-              <a:ext uri="{FF2B5EF4-FFF2-40B4-BE49-F238E27FC236}">
-                <a16:creationId xmlns:a16="http://schemas.microsoft.com/office/drawing/2014/main" id="{B8F6C419-DBCE-E919-F6D3-D6F1CEC4C80F}"/>
-              </a:ext>
-            </a:extLst>
-          </p:cNvPr>
-          <p:cNvCxnSpPr>
-            <a:cxnSpLocks/>
-          </p:cNvCxnSpPr>
-          <p:nvPr/>
-        </p:nvCxnSpPr>
-        <p:spPr>
-          <a:xfrm flipV="1">
-            <a:off x="6430127" y="1791650"/>
-            <a:ext cx="1828743" cy="321893"/>
-          </a:xfrm>
-          <a:prstGeom prst="straightConnector1">
-            <a:avLst/>
-          </a:prstGeom>
-          <a:ln w="50800">
-            <a:solidFill>
-              <a:srgbClr val="00B050"/>
-            </a:solidFill>
-            <a:tailEnd type="triangle"/>
-          </a:ln>
-        </p:spPr>
-        <p:style>
-          <a:lnRef idx="1">
-            <a:schemeClr val="dk1"/>
-          </a:lnRef>
-          <a:fillRef idx="0">
-            <a:schemeClr val="dk1"/>
-          </a:fillRef>
-          <a:effectRef idx="0">
-            <a:schemeClr val="dk1"/>
-          </a:effectRef>
-          <a:fontRef idx="minor">
-            <a:schemeClr val="tx1"/>
-          </a:fontRef>
-        </p:style>
-      </p:cxnSp>
-      <p:sp>
-        <p:nvSpPr>
-          <p:cNvPr id="10" name="TextBox 9">
-            <a:extLst>
-              <a:ext uri="{FF2B5EF4-FFF2-40B4-BE49-F238E27FC236}">
-                <a16:creationId xmlns:a16="http://schemas.microsoft.com/office/drawing/2014/main" id="{29F95840-E7D3-A699-0510-B65EABC66353}"/>
+        </p:txBody>
+      </p:sp>
+      <p:sp>
+        <p:nvSpPr>
+          <p:cNvPr id="25" name="TextBox 24">
+            <a:extLst>
+              <a:ext uri="{FF2B5EF4-FFF2-40B4-BE49-F238E27FC236}">
+                <a16:creationId xmlns:a16="http://schemas.microsoft.com/office/drawing/2014/main" id="{66C6CEA1-DFEF-4042-895A-E5CF0D97CB34}"/>
               </a:ext>
             </a:extLst>
           </p:cNvPr>
@@ -5707,8 +5945,8 @@
         </p:nvSpPr>
         <p:spPr>
           <a:xfrm>
-            <a:off x="6892631" y="2060607"/>
-            <a:ext cx="1113831" cy="646331"/>
+            <a:off x="355198" y="151491"/>
+            <a:ext cx="4685770" cy="369332"/>
           </a:xfrm>
           <a:prstGeom prst="rect">
             <a:avLst/>
@@ -5722,181 +5960,8 @@
           <a:lstStyle/>
           <a:p>
             <a:r>
-              <a:rPr lang="en-US" sz="1200" dirty="0"/>
-              <a:t>Increase score </a:t>
-            </a:r>
-          </a:p>
-          <a:p>
-            <a:r>
-              <a:rPr lang="en-US" sz="1200" dirty="0"/>
-              <a:t>when enemy </a:t>
-            </a:r>
-          </a:p>
-          <a:p>
-            <a:r>
-              <a:rPr lang="en-US" sz="1200" dirty="0"/>
-              <a:t>is killed</a:t>
-            </a:r>
-          </a:p>
-        </p:txBody>
-      </p:sp>
-      <p:sp>
-        <p:nvSpPr>
-          <p:cNvPr id="11" name="Rounded Rectangle 10">
-            <a:extLst>
-              <a:ext uri="{FF2B5EF4-FFF2-40B4-BE49-F238E27FC236}">
-                <a16:creationId xmlns:a16="http://schemas.microsoft.com/office/drawing/2014/main" id="{62C122FF-D74E-01F6-846B-76093329D289}"/>
-              </a:ext>
-            </a:extLst>
-          </p:cNvPr>
-          <p:cNvSpPr/>
-          <p:nvPr/>
-        </p:nvSpPr>
-        <p:spPr>
-          <a:xfrm>
-            <a:off x="8258869" y="3429000"/>
-            <a:ext cx="2289411" cy="1315458"/>
-          </a:xfrm>
-          <a:prstGeom prst="roundRect">
-            <a:avLst/>
-          </a:prstGeom>
-          <a:ln w="25400">
-            <a:solidFill>
-              <a:schemeClr val="accent6"/>
-            </a:solidFill>
-          </a:ln>
-        </p:spPr>
-        <p:style>
-          <a:lnRef idx="2">
-            <a:schemeClr val="accent2"/>
-          </a:lnRef>
-          <a:fillRef idx="1">
-            <a:schemeClr val="lt1"/>
-          </a:fillRef>
-          <a:effectRef idx="0">
-            <a:schemeClr val="accent2"/>
-          </a:effectRef>
-          <a:fontRef idx="minor">
-            <a:schemeClr val="dk1"/>
-          </a:fontRef>
-        </p:style>
-        <p:txBody>
-          <a:bodyPr rtlCol="0" anchor="t" anchorCtr="0"/>
-          <a:lstStyle/>
-          <a:p>
-            <a:pPr algn="ctr"/>
-            <a:r>
-              <a:rPr lang="en-US" sz="1200" b="1" dirty="0"/>
-              <a:t>UI Manager</a:t>
-            </a:r>
-            <a:endParaRPr lang="en-US" sz="1200" dirty="0"/>
-          </a:p>
-          <a:p>
-            <a:endParaRPr lang="en-US" sz="1200" dirty="0"/>
-          </a:p>
-          <a:p>
-            <a:r>
-              <a:rPr lang="en-US" sz="1200" dirty="0"/>
-              <a:t>Update:</a:t>
-            </a:r>
-          </a:p>
-          <a:p>
-            <a:pPr marL="171450" indent="-171450">
-              <a:buFont typeface="Arial" panose="020B0604020202020204" pitchFamily="34" charset="0"/>
-              <a:buChar char="•"/>
-            </a:pPr>
-            <a:r>
-              <a:rPr lang="en-US" sz="1200" dirty="0"/>
-              <a:t>Read current score and update UI</a:t>
-            </a:r>
-          </a:p>
-        </p:txBody>
-      </p:sp>
-      <p:cxnSp>
-        <p:nvCxnSpPr>
-          <p:cNvPr id="13" name="Straight Arrow Connector 12">
-            <a:extLst>
-              <a:ext uri="{FF2B5EF4-FFF2-40B4-BE49-F238E27FC236}">
-                <a16:creationId xmlns:a16="http://schemas.microsoft.com/office/drawing/2014/main" id="{84F50779-9999-8EB9-99F2-D877426953D6}"/>
-              </a:ext>
-            </a:extLst>
-          </p:cNvPr>
-          <p:cNvCxnSpPr>
-            <a:cxnSpLocks/>
-            <a:stCxn id="11" idx="0"/>
-            <a:endCxn id="6" idx="2"/>
-          </p:cNvCxnSpPr>
-          <p:nvPr/>
-        </p:nvCxnSpPr>
-        <p:spPr>
-          <a:xfrm flipV="1">
-            <a:off x="9403575" y="2401294"/>
-            <a:ext cx="1" cy="1027706"/>
-          </a:xfrm>
-          <a:prstGeom prst="straightConnector1">
-            <a:avLst/>
-          </a:prstGeom>
-          <a:ln w="50800">
-            <a:solidFill>
-              <a:srgbClr val="FFC000"/>
-            </a:solidFill>
-            <a:prstDash val="solid"/>
-            <a:tailEnd type="triangle"/>
-          </a:ln>
-        </p:spPr>
-        <p:style>
-          <a:lnRef idx="1">
-            <a:schemeClr val="dk1"/>
-          </a:lnRef>
-          <a:fillRef idx="0">
-            <a:schemeClr val="dk1"/>
-          </a:fillRef>
-          <a:effectRef idx="0">
-            <a:schemeClr val="dk1"/>
-          </a:effectRef>
-          <a:fontRef idx="minor">
-            <a:schemeClr val="tx1"/>
-          </a:fontRef>
-        </p:style>
-      </p:cxnSp>
-      <p:sp>
-        <p:nvSpPr>
-          <p:cNvPr id="17" name="TextBox 16">
-            <a:extLst>
-              <a:ext uri="{FF2B5EF4-FFF2-40B4-BE49-F238E27FC236}">
-                <a16:creationId xmlns:a16="http://schemas.microsoft.com/office/drawing/2014/main" id="{1F5C2D1F-04DC-CBD6-5674-6024656D40A6}"/>
-              </a:ext>
-            </a:extLst>
-          </p:cNvPr>
-          <p:cNvSpPr txBox="1"/>
-          <p:nvPr/>
-        </p:nvSpPr>
-        <p:spPr>
-          <a:xfrm>
-            <a:off x="9481128" y="2591981"/>
-            <a:ext cx="988027" cy="461665"/>
-          </a:xfrm>
-          <a:prstGeom prst="rect">
-            <a:avLst/>
-          </a:prstGeom>
-          <a:noFill/>
-        </p:spPr>
-        <p:txBody>
-          <a:bodyPr wrap="none" rtlCol="0">
-            <a:spAutoFit/>
-          </a:bodyPr>
-          <a:lstStyle/>
-          <a:p>
-            <a:r>
-              <a:rPr lang="en-US" sz="1200" dirty="0"/>
-              <a:t>Read current</a:t>
-            </a:r>
-            <a:br>
-              <a:rPr lang="en-US" sz="1200" dirty="0"/>
-            </a:br>
-            <a:r>
-              <a:rPr lang="en-US" sz="1200" dirty="0"/>
-              <a:t>score</a:t>
+              <a:rPr lang="en-US" b="1" dirty="0"/>
+              <a:t>Entity Relationship Diagram: Before refactoring</a:t>
             </a:r>
           </a:p>
         </p:txBody>
@@ -5904,7 +5969,7 @@
     </p:spTree>
     <p:extLst>
       <p:ext uri="{BB962C8B-B14F-4D97-AF65-F5344CB8AC3E}">
-        <p14:creationId xmlns:p14="http://schemas.microsoft.com/office/powerpoint/2010/main" val="3184761484"/>
+        <p14:creationId xmlns:p14="http://schemas.microsoft.com/office/powerpoint/2010/main" val="1358887530"/>
       </p:ext>
     </p:extLst>
   </p:cSld>
@@ -5933,10 +5998,10 @@
       </p:grpSpPr>
       <p:sp>
         <p:nvSpPr>
-          <p:cNvPr id="4" name="TextBox 3">
-            <a:extLst>
-              <a:ext uri="{FF2B5EF4-FFF2-40B4-BE49-F238E27FC236}">
-                <a16:creationId xmlns:a16="http://schemas.microsoft.com/office/drawing/2014/main" id="{BA24AE7D-97EF-BBFD-8F95-65FB6E309D5A}"/>
+          <p:cNvPr id="25" name="TextBox 24">
+            <a:extLst>
+              <a:ext uri="{FF2B5EF4-FFF2-40B4-BE49-F238E27FC236}">
+                <a16:creationId xmlns:a16="http://schemas.microsoft.com/office/drawing/2014/main" id="{66C6CEA1-DFEF-4042-895A-E5CF0D97CB34}"/>
               </a:ext>
             </a:extLst>
           </p:cNvPr>
@@ -5946,7 +6011,7 @@
         <p:spPr>
           <a:xfrm>
             <a:off x="355198" y="151491"/>
-            <a:ext cx="2237728" cy="369332"/>
+            <a:ext cx="4541564" cy="369332"/>
           </a:xfrm>
           <a:prstGeom prst="rect">
             <a:avLst/>
@@ -5961,17 +6026,17 @@
           <a:p>
             <a:r>
               <a:rPr lang="en-US" b="1" dirty="0"/>
-              <a:t>Finite State Machines</a:t>
-            </a:r>
-          </a:p>
-        </p:txBody>
-      </p:sp>
-      <p:sp>
-        <p:nvSpPr>
-          <p:cNvPr id="5" name="Rounded Rectangle 4">
-            <a:extLst>
-              <a:ext uri="{FF2B5EF4-FFF2-40B4-BE49-F238E27FC236}">
-                <a16:creationId xmlns:a16="http://schemas.microsoft.com/office/drawing/2014/main" id="{948BF349-D987-054D-7D60-1D6C098D52C8}"/>
+              <a:t>Entity Relationship Diagram: After refactoring</a:t>
+            </a:r>
+          </a:p>
+        </p:txBody>
+      </p:sp>
+      <p:sp>
+        <p:nvSpPr>
+          <p:cNvPr id="2" name="Rounded Rectangle 1">
+            <a:extLst>
+              <a:ext uri="{FF2B5EF4-FFF2-40B4-BE49-F238E27FC236}">
+                <a16:creationId xmlns:a16="http://schemas.microsoft.com/office/drawing/2014/main" id="{A1D93B66-ECF3-39A4-1D60-934CFC20C1A9}"/>
               </a:ext>
             </a:extLst>
           </p:cNvPr>
@@ -5980,8 +6045,59 @@
         </p:nvSpPr>
         <p:spPr>
           <a:xfrm>
-            <a:off x="1731205" y="2860592"/>
-            <a:ext cx="2014566" cy="1136815"/>
+            <a:off x="1317859" y="1198255"/>
+            <a:ext cx="5340411" cy="4240437"/>
+          </a:xfrm>
+          <a:prstGeom prst="roundRect">
+            <a:avLst/>
+          </a:prstGeom>
+          <a:noFill/>
+          <a:ln w="25400">
+            <a:prstDash val="dash"/>
+          </a:ln>
+        </p:spPr>
+        <p:style>
+          <a:lnRef idx="2">
+            <a:schemeClr val="accent6"/>
+          </a:lnRef>
+          <a:fillRef idx="1">
+            <a:schemeClr val="lt1"/>
+          </a:fillRef>
+          <a:effectRef idx="0">
+            <a:schemeClr val="accent6"/>
+          </a:effectRef>
+          <a:fontRef idx="minor">
+            <a:schemeClr val="dk1"/>
+          </a:fontRef>
+        </p:style>
+        <p:txBody>
+          <a:bodyPr rtlCol="0" anchor="t" anchorCtr="0"/>
+          <a:lstStyle/>
+          <a:p>
+            <a:pPr algn="ctr"/>
+            <a:r>
+              <a:rPr lang="en-US" dirty="0"/>
+              <a:t>Ship</a:t>
+            </a:r>
+          </a:p>
+        </p:txBody>
+      </p:sp>
+      <p:sp>
+        <p:nvSpPr>
+          <p:cNvPr id="3" name="Rounded Rectangle 2">
+            <a:extLst>
+              <a:ext uri="{FF2B5EF4-FFF2-40B4-BE49-F238E27FC236}">
+                <a16:creationId xmlns:a16="http://schemas.microsoft.com/office/drawing/2014/main" id="{1BDECC10-2855-42A0-B6A6-CCE66BB527F7}"/>
+              </a:ext>
+            </a:extLst>
+          </p:cNvPr>
+          <p:cNvSpPr/>
+          <p:nvPr/>
+        </p:nvSpPr>
+        <p:spPr>
+          <a:xfrm>
+            <a:off x="4140717" y="1791650"/>
+            <a:ext cx="2289410" cy="3344893"/>
           </a:xfrm>
           <a:prstGeom prst="roundRect">
             <a:avLst/>
@@ -6008,27 +6124,373 @@
           <a:p>
             <a:pPr algn="ctr"/>
             <a:r>
-              <a:rPr lang="en-US" sz="2000" dirty="0"/>
-              <a:t>State Name 1</a:t>
-            </a:r>
-          </a:p>
-          <a:p>
+              <a:rPr lang="en-US" sz="1200" b="1" dirty="0"/>
+              <a:t>Fire Lasers</a:t>
+            </a:r>
             <a:endParaRPr lang="en-US" sz="1200" dirty="0"/>
           </a:p>
           <a:p>
             <a:r>
               <a:rPr lang="en-US" sz="1200" dirty="0"/>
-              <a:t>Description of action while in state.</a:t>
-            </a:r>
+              <a:t>Params (for designer):</a:t>
+            </a:r>
+          </a:p>
+          <a:p>
+            <a:pPr marL="171450" indent="-171450">
+              <a:buFont typeface="Arial" panose="020B0604020202020204" pitchFamily="34" charset="0"/>
+              <a:buChar char="•"/>
+            </a:pPr>
+            <a:r>
+              <a:rPr lang="en-US" sz="1200" dirty="0"/>
+              <a:t>Maximum fire distance</a:t>
+            </a:r>
+          </a:p>
+          <a:p>
+            <a:pPr marL="171450" indent="-171450">
+              <a:buFont typeface="Arial" panose="020B0604020202020204" pitchFamily="34" charset="0"/>
+              <a:buChar char="•"/>
+            </a:pPr>
+            <a:r>
+              <a:rPr lang="en-US" sz="1200" dirty="0"/>
+              <a:t>Speed of light</a:t>
+            </a:r>
+          </a:p>
+          <a:p>
+            <a:pPr marL="628650" lvl="1" indent="-171450">
+              <a:buFont typeface="Arial" panose="020B0604020202020204" pitchFamily="34" charset="0"/>
+              <a:buChar char="•"/>
+            </a:pPr>
+            <a:endParaRPr lang="en-US" sz="1200" dirty="0"/>
+          </a:p>
+          <a:p>
+            <a:r>
+              <a:rPr lang="en-US" sz="1200" dirty="0"/>
+              <a:t>State:</a:t>
+            </a:r>
+          </a:p>
+          <a:p>
+            <a:pPr marL="171450" indent="-171450">
+              <a:buFont typeface="Arial" panose="020B0604020202020204" pitchFamily="34" charset="0"/>
+              <a:buChar char="•"/>
+            </a:pPr>
+            <a:r>
+              <a:rPr lang="en-US" sz="1200" dirty="0"/>
+              <a:t>State of laser: Firing / Ending</a:t>
+            </a:r>
+          </a:p>
+          <a:p>
+            <a:pPr marL="171450" indent="-171450">
+              <a:buFont typeface="Arial" panose="020B0604020202020204" pitchFamily="34" charset="0"/>
+              <a:buChar char="•"/>
+            </a:pPr>
+            <a:r>
+              <a:rPr lang="en-US" sz="1200" dirty="0"/>
+              <a:t>Distance laser has moved</a:t>
+            </a:r>
+          </a:p>
+          <a:p>
+            <a:pPr marL="171450" indent="-171450">
+              <a:buFont typeface="Arial" panose="020B0604020202020204" pitchFamily="34" charset="0"/>
+              <a:buChar char="•"/>
+            </a:pPr>
+            <a:r>
+              <a:rPr lang="en-US" sz="1200" dirty="0"/>
+              <a:t>Distance to laser target</a:t>
+            </a:r>
+          </a:p>
+          <a:p>
+            <a:pPr marL="171450" indent="-171450">
+              <a:buFont typeface="Arial" panose="020B0604020202020204" pitchFamily="34" charset="0"/>
+              <a:buChar char="•"/>
+            </a:pPr>
+            <a:r>
+              <a:rPr lang="en-US" sz="1200" dirty="0"/>
+              <a:t>Current laser target</a:t>
+            </a:r>
+          </a:p>
+          <a:p>
+            <a:endParaRPr lang="en-US" sz="1200" dirty="0"/>
+          </a:p>
+          <a:p>
+            <a:r>
+              <a:rPr lang="en-US" sz="1200" dirty="0"/>
+              <a:t>Update:</a:t>
+            </a:r>
+          </a:p>
+          <a:p>
+            <a:pPr marL="171450" indent="-171450">
+              <a:buFont typeface="Arial" panose="020B0604020202020204" pitchFamily="34" charset="0"/>
+              <a:buChar char="•"/>
+            </a:pPr>
+            <a:r>
+              <a:rPr lang="en-US" sz="1200" dirty="0"/>
+              <a:t>Update the state of the laser</a:t>
+            </a:r>
+          </a:p>
+          <a:p>
+            <a:pPr marL="171450" indent="-171450">
+              <a:buFont typeface="Arial" panose="020B0604020202020204" pitchFamily="34" charset="0"/>
+              <a:buChar char="•"/>
+            </a:pPr>
+            <a:r>
+              <a:rPr lang="en-US" sz="1200" dirty="0"/>
+              <a:t>Destroy hit enemies</a:t>
+            </a:r>
+          </a:p>
+        </p:txBody>
+      </p:sp>
+      <p:sp>
+        <p:nvSpPr>
+          <p:cNvPr id="5" name="Rounded Rectangle 4">
+            <a:extLst>
+              <a:ext uri="{FF2B5EF4-FFF2-40B4-BE49-F238E27FC236}">
+                <a16:creationId xmlns:a16="http://schemas.microsoft.com/office/drawing/2014/main" id="{E516955E-86E5-404C-F5B4-5EC4F52983F6}"/>
+              </a:ext>
+            </a:extLst>
+          </p:cNvPr>
+          <p:cNvSpPr/>
+          <p:nvPr/>
+        </p:nvSpPr>
+        <p:spPr>
+          <a:xfrm>
+            <a:off x="1552220" y="1831139"/>
+            <a:ext cx="2289410" cy="2913319"/>
+          </a:xfrm>
+          <a:prstGeom prst="roundRect">
+            <a:avLst/>
+          </a:prstGeom>
+          <a:ln w="25400"/>
+        </p:spPr>
+        <p:style>
+          <a:lnRef idx="2">
+            <a:schemeClr val="accent2"/>
+          </a:lnRef>
+          <a:fillRef idx="1">
+            <a:schemeClr val="lt1"/>
+          </a:fillRef>
+          <a:effectRef idx="0">
+            <a:schemeClr val="accent2"/>
+          </a:effectRef>
+          <a:fontRef idx="minor">
+            <a:schemeClr val="dk1"/>
+          </a:fontRef>
+        </p:style>
+        <p:txBody>
+          <a:bodyPr rtlCol="0" anchor="t" anchorCtr="0"/>
+          <a:lstStyle/>
+          <a:p>
+            <a:pPr algn="ctr"/>
+            <a:r>
+              <a:rPr lang="en-US" sz="1200" b="1" dirty="0"/>
+              <a:t>Player Move</a:t>
+            </a:r>
+            <a:endParaRPr lang="en-US" sz="1200" dirty="0"/>
+          </a:p>
+          <a:p>
+            <a:r>
+              <a:rPr lang="en-US" sz="1200" dirty="0"/>
+              <a:t>Params (for designer):</a:t>
+            </a:r>
+          </a:p>
+          <a:p>
+            <a:pPr marL="171450" indent="-171450">
+              <a:buFont typeface="Arial" panose="020B0604020202020204" pitchFamily="34" charset="0"/>
+              <a:buChar char="•"/>
+            </a:pPr>
+            <a:r>
+              <a:rPr lang="en-US" sz="1200" dirty="0"/>
+              <a:t>Forward movement speed</a:t>
+            </a:r>
+          </a:p>
+          <a:p>
+            <a:pPr marL="171450" indent="-171450">
+              <a:buFont typeface="Arial" panose="020B0604020202020204" pitchFamily="34" charset="0"/>
+              <a:buChar char="•"/>
+            </a:pPr>
+            <a:r>
+              <a:rPr lang="en-US" sz="1200" dirty="0"/>
+              <a:t>Turning speed</a:t>
+            </a:r>
+          </a:p>
+          <a:p>
+            <a:endParaRPr lang="en-US" sz="1200" dirty="0"/>
+          </a:p>
+          <a:p>
+            <a:r>
+              <a:rPr lang="en-US" sz="1200" dirty="0"/>
+              <a:t>State:</a:t>
+            </a:r>
+          </a:p>
+          <a:p>
+            <a:pPr marL="171450" indent="-171450">
+              <a:buFont typeface="Arial" panose="020B0604020202020204" pitchFamily="34" charset="0"/>
+              <a:buChar char="•"/>
+            </a:pPr>
+            <a:r>
+              <a:rPr lang="en-US" sz="1200" dirty="0"/>
+              <a:t>Position / rotation of ship</a:t>
+            </a:r>
+          </a:p>
+          <a:p>
+            <a:endParaRPr lang="en-US" sz="1200" dirty="0"/>
+          </a:p>
+          <a:p>
+            <a:r>
+              <a:rPr lang="en-US" sz="1200" dirty="0"/>
+              <a:t>Update:</a:t>
+            </a:r>
+          </a:p>
+          <a:p>
+            <a:pPr marL="171450" indent="-171450">
+              <a:buFont typeface="Arial" panose="020B0604020202020204" pitchFamily="34" charset="0"/>
+              <a:buChar char="•"/>
+            </a:pPr>
+            <a:r>
+              <a:rPr lang="en-US" sz="1200" dirty="0"/>
+              <a:t>Move and rotate the ship </a:t>
+            </a:r>
+          </a:p>
+          <a:p>
+            <a:pPr marL="171450" indent="-171450">
+              <a:buFont typeface="Arial" panose="020B0604020202020204" pitchFamily="34" charset="0"/>
+              <a:buChar char="•"/>
+            </a:pPr>
+            <a:endParaRPr lang="en-US" sz="1200" dirty="0"/>
+          </a:p>
+          <a:p>
+            <a:r>
+              <a:rPr lang="en-US" sz="1200" dirty="0"/>
+              <a:t>On collision with enemy:</a:t>
+            </a:r>
+          </a:p>
+          <a:p>
+            <a:pPr marL="171450" indent="-171450">
+              <a:buFont typeface="Arial" panose="020B0604020202020204" pitchFamily="34" charset="0"/>
+              <a:buChar char="•"/>
+            </a:pPr>
+            <a:r>
+              <a:rPr lang="en-US" sz="1200" dirty="0"/>
+              <a:t>Destroy the ship</a:t>
+            </a:r>
+          </a:p>
+          <a:p>
+            <a:pPr marL="171450" indent="-171450">
+              <a:buFont typeface="Arial" panose="020B0604020202020204" pitchFamily="34" charset="0"/>
+              <a:buChar char="•"/>
+            </a:pPr>
+            <a:r>
+              <a:rPr lang="en-US" sz="1200" dirty="0"/>
+              <a:t>Create an explosion</a:t>
+            </a:r>
+          </a:p>
+          <a:p>
+            <a:endParaRPr lang="en-US" sz="1200" dirty="0"/>
+          </a:p>
+          <a:p>
+            <a:endParaRPr lang="en-US" sz="1200" dirty="0"/>
+          </a:p>
+        </p:txBody>
+      </p:sp>
+      <p:sp>
+        <p:nvSpPr>
+          <p:cNvPr id="6" name="Rounded Rectangle 5">
+            <a:extLst>
+              <a:ext uri="{FF2B5EF4-FFF2-40B4-BE49-F238E27FC236}">
+                <a16:creationId xmlns:a16="http://schemas.microsoft.com/office/drawing/2014/main" id="{5756FC55-E973-15D6-1CBF-90F064D7FFA4}"/>
+              </a:ext>
+            </a:extLst>
+          </p:cNvPr>
+          <p:cNvSpPr/>
+          <p:nvPr/>
+        </p:nvSpPr>
+        <p:spPr>
+          <a:xfrm>
+            <a:off x="8258870" y="1019216"/>
+            <a:ext cx="2289411" cy="1382078"/>
+          </a:xfrm>
+          <a:prstGeom prst="roundRect">
+            <a:avLst/>
+          </a:prstGeom>
+          <a:ln w="25400">
+            <a:solidFill>
+              <a:schemeClr val="accent6"/>
+            </a:solidFill>
+          </a:ln>
+        </p:spPr>
+        <p:style>
+          <a:lnRef idx="2">
+            <a:schemeClr val="accent2"/>
+          </a:lnRef>
+          <a:fillRef idx="1">
+            <a:schemeClr val="lt1"/>
+          </a:fillRef>
+          <a:effectRef idx="0">
+            <a:schemeClr val="accent2"/>
+          </a:effectRef>
+          <a:fontRef idx="minor">
+            <a:schemeClr val="dk1"/>
+          </a:fontRef>
+        </p:style>
+        <p:txBody>
+          <a:bodyPr rtlCol="0" anchor="t" anchorCtr="0"/>
+          <a:lstStyle/>
+          <a:p>
+            <a:pPr algn="ctr"/>
+            <a:r>
+              <a:rPr lang="en-US" sz="1200" b="1" dirty="0"/>
+              <a:t>Scorekeeper</a:t>
+            </a:r>
+            <a:endParaRPr lang="en-US" sz="1200" dirty="0"/>
+          </a:p>
+          <a:p>
+            <a:r>
+              <a:rPr lang="en-US" sz="1200" dirty="0"/>
+              <a:t>Params (for designer):</a:t>
+            </a:r>
+          </a:p>
+          <a:p>
+            <a:pPr marL="171450" indent="-171450">
+              <a:buFont typeface="Arial" panose="020B0604020202020204" pitchFamily="34" charset="0"/>
+              <a:buChar char="•"/>
+            </a:pPr>
+            <a:r>
+              <a:rPr lang="en-US" sz="1200" dirty="0"/>
+              <a:t>Score per enemy killed</a:t>
+            </a:r>
+          </a:p>
+          <a:p>
+            <a:endParaRPr lang="en-US" sz="1200" dirty="0"/>
+          </a:p>
+          <a:p>
+            <a:r>
+              <a:rPr lang="en-US" sz="1200" dirty="0"/>
+              <a:t>State:</a:t>
+            </a:r>
+          </a:p>
+          <a:p>
+            <a:pPr marL="171450" indent="-171450">
+              <a:buFont typeface="Arial" panose="020B0604020202020204" pitchFamily="34" charset="0"/>
+              <a:buChar char="•"/>
+            </a:pPr>
+            <a:r>
+              <a:rPr lang="en-US" sz="1200" dirty="0"/>
+              <a:t>Current score</a:t>
+            </a:r>
+          </a:p>
+          <a:p>
+            <a:endParaRPr lang="en-US" sz="1200" dirty="0"/>
+          </a:p>
+          <a:p>
+            <a:endParaRPr lang="en-US" sz="1200" dirty="0"/>
           </a:p>
         </p:txBody>
       </p:sp>
       <p:cxnSp>
         <p:nvCxnSpPr>
-          <p:cNvPr id="9" name="Straight Arrow Connector 8">
-            <a:extLst>
-              <a:ext uri="{FF2B5EF4-FFF2-40B4-BE49-F238E27FC236}">
-                <a16:creationId xmlns:a16="http://schemas.microsoft.com/office/drawing/2014/main" id="{C379F455-7089-EA43-FCAC-5D025263A1B8}"/>
+          <p:cNvPr id="7" name="Straight Arrow Connector 6">
+            <a:extLst>
+              <a:ext uri="{FF2B5EF4-FFF2-40B4-BE49-F238E27FC236}">
+                <a16:creationId xmlns:a16="http://schemas.microsoft.com/office/drawing/2014/main" id="{B8F6C419-DBCE-E919-F6D3-D6F1CEC4C80F}"/>
               </a:ext>
             </a:extLst>
           </p:cNvPr>
@@ -6038,18 +6500,17 @@
           <p:nvPr/>
         </p:nvCxnSpPr>
         <p:spPr>
-          <a:xfrm>
-            <a:off x="1564849" y="2035404"/>
-            <a:ext cx="680712" cy="825188"/>
+          <a:xfrm flipV="1">
+            <a:off x="6430127" y="1791650"/>
+            <a:ext cx="1828743" cy="321893"/>
           </a:xfrm>
           <a:prstGeom prst="straightConnector1">
             <a:avLst/>
           </a:prstGeom>
           <a:ln w="50800">
             <a:solidFill>
-              <a:srgbClr val="FFC000"/>
+              <a:srgbClr val="00B050"/>
             </a:solidFill>
-            <a:prstDash val="solid"/>
             <a:tailEnd type="triangle"/>
           </a:ln>
         </p:spPr>
@@ -6070,10 +6531,10 @@
       </p:cxnSp>
       <p:sp>
         <p:nvSpPr>
-          <p:cNvPr id="11" name="TextBox 10">
-            <a:extLst>
-              <a:ext uri="{FF2B5EF4-FFF2-40B4-BE49-F238E27FC236}">
-                <a16:creationId xmlns:a16="http://schemas.microsoft.com/office/drawing/2014/main" id="{909903AF-4BDA-FD86-E513-2EB44A65BCAF}"/>
+          <p:cNvPr id="10" name="TextBox 9">
+            <a:extLst>
+              <a:ext uri="{FF2B5EF4-FFF2-40B4-BE49-F238E27FC236}">
+                <a16:creationId xmlns:a16="http://schemas.microsoft.com/office/drawing/2014/main" id="{29F95840-E7D3-A699-0510-B65EABC66353}"/>
               </a:ext>
             </a:extLst>
           </p:cNvPr>
@@ -6082,8 +6543,8 @@
         </p:nvSpPr>
         <p:spPr>
           <a:xfrm>
-            <a:off x="1098916" y="2218654"/>
-            <a:ext cx="632289" cy="369332"/>
+            <a:off x="6892631" y="2060607"/>
+            <a:ext cx="1113831" cy="646331"/>
           </a:xfrm>
           <a:prstGeom prst="rect">
             <a:avLst/>
@@ -6097,18 +6558,30 @@
           <a:lstStyle/>
           <a:p>
             <a:r>
-              <a:rPr lang="en-US" dirty="0"/>
-              <a:t>Start</a:t>
-            </a:r>
-          </a:p>
-        </p:txBody>
-      </p:sp>
-      <p:sp>
-        <p:nvSpPr>
-          <p:cNvPr id="12" name="Rounded Rectangle 11">
-            <a:extLst>
-              <a:ext uri="{FF2B5EF4-FFF2-40B4-BE49-F238E27FC236}">
-                <a16:creationId xmlns:a16="http://schemas.microsoft.com/office/drawing/2014/main" id="{4D3F3AA8-3D36-BFFE-32E7-CDFACD4F19F6}"/>
+              <a:rPr lang="en-US" sz="1200" dirty="0"/>
+              <a:t>Increase score </a:t>
+            </a:r>
+          </a:p>
+          <a:p>
+            <a:r>
+              <a:rPr lang="en-US" sz="1200" dirty="0"/>
+              <a:t>when enemy </a:t>
+            </a:r>
+          </a:p>
+          <a:p>
+            <a:r>
+              <a:rPr lang="en-US" sz="1200" dirty="0"/>
+              <a:t>is killed</a:t>
+            </a:r>
+          </a:p>
+        </p:txBody>
+      </p:sp>
+      <p:sp>
+        <p:nvSpPr>
+          <p:cNvPr id="11" name="Rounded Rectangle 10">
+            <a:extLst>
+              <a:ext uri="{FF2B5EF4-FFF2-40B4-BE49-F238E27FC236}">
+                <a16:creationId xmlns:a16="http://schemas.microsoft.com/office/drawing/2014/main" id="{62C122FF-D74E-01F6-846B-76093329D289}"/>
               </a:ext>
             </a:extLst>
           </p:cNvPr>
@@ -6117,13 +6590,17 @@
         </p:nvSpPr>
         <p:spPr>
           <a:xfrm>
-            <a:off x="5088717" y="1081839"/>
-            <a:ext cx="2014566" cy="1136815"/>
+            <a:off x="8258869" y="3429000"/>
+            <a:ext cx="2289411" cy="1315458"/>
           </a:xfrm>
           <a:prstGeom prst="roundRect">
             <a:avLst/>
           </a:prstGeom>
-          <a:ln w="25400"/>
+          <a:ln w="25400">
+            <a:solidFill>
+              <a:schemeClr val="accent6"/>
+            </a:solidFill>
+          </a:ln>
         </p:spPr>
         <p:style>
           <a:lnRef idx="2">
@@ -6145,27 +6622,192 @@
           <a:p>
             <a:pPr algn="ctr"/>
             <a:r>
-              <a:rPr lang="en-US" sz="2000" dirty="0"/>
-              <a:t>State Name 2</a:t>
-            </a:r>
-          </a:p>
-          <a:p>
+              <a:rPr lang="en-US" sz="1200" b="1" dirty="0"/>
+              <a:t>UI Manager</a:t>
+            </a:r>
             <a:endParaRPr lang="en-US" sz="1200" dirty="0"/>
           </a:p>
           <a:p>
+            <a:endParaRPr lang="en-US" sz="1200" dirty="0"/>
+          </a:p>
+          <a:p>
             <a:r>
               <a:rPr lang="en-US" sz="1200" dirty="0"/>
-              <a:t>Description of action while in state.</a:t>
-            </a:r>
-          </a:p>
-        </p:txBody>
-      </p:sp>
-      <p:sp>
-        <p:nvSpPr>
-          <p:cNvPr id="13" name="Rounded Rectangle 12">
-            <a:extLst>
-              <a:ext uri="{FF2B5EF4-FFF2-40B4-BE49-F238E27FC236}">
-                <a16:creationId xmlns:a16="http://schemas.microsoft.com/office/drawing/2014/main" id="{903B335A-776B-8705-9741-F7FB2818DFF8}"/>
+              <a:t>Update:</a:t>
+            </a:r>
+          </a:p>
+          <a:p>
+            <a:pPr marL="171450" indent="-171450">
+              <a:buFont typeface="Arial" panose="020B0604020202020204" pitchFamily="34" charset="0"/>
+              <a:buChar char="•"/>
+            </a:pPr>
+            <a:r>
+              <a:rPr lang="en-US" sz="1200" dirty="0"/>
+              <a:t>Read current score and update UI</a:t>
+            </a:r>
+          </a:p>
+        </p:txBody>
+      </p:sp>
+      <p:cxnSp>
+        <p:nvCxnSpPr>
+          <p:cNvPr id="13" name="Straight Arrow Connector 12">
+            <a:extLst>
+              <a:ext uri="{FF2B5EF4-FFF2-40B4-BE49-F238E27FC236}">
+                <a16:creationId xmlns:a16="http://schemas.microsoft.com/office/drawing/2014/main" id="{84F50779-9999-8EB9-99F2-D877426953D6}"/>
+              </a:ext>
+            </a:extLst>
+          </p:cNvPr>
+          <p:cNvCxnSpPr>
+            <a:cxnSpLocks/>
+            <a:stCxn id="11" idx="0"/>
+            <a:endCxn id="6" idx="2"/>
+          </p:cNvCxnSpPr>
+          <p:nvPr/>
+        </p:nvCxnSpPr>
+        <p:spPr>
+          <a:xfrm flipV="1">
+            <a:off x="9403575" y="2401294"/>
+            <a:ext cx="1" cy="1027706"/>
+          </a:xfrm>
+          <a:prstGeom prst="straightConnector1">
+            <a:avLst/>
+          </a:prstGeom>
+          <a:ln w="50800">
+            <a:solidFill>
+              <a:srgbClr val="FFC000"/>
+            </a:solidFill>
+            <a:prstDash val="solid"/>
+            <a:tailEnd type="triangle"/>
+          </a:ln>
+        </p:spPr>
+        <p:style>
+          <a:lnRef idx="1">
+            <a:schemeClr val="dk1"/>
+          </a:lnRef>
+          <a:fillRef idx="0">
+            <a:schemeClr val="dk1"/>
+          </a:fillRef>
+          <a:effectRef idx="0">
+            <a:schemeClr val="dk1"/>
+          </a:effectRef>
+          <a:fontRef idx="minor">
+            <a:schemeClr val="tx1"/>
+          </a:fontRef>
+        </p:style>
+      </p:cxnSp>
+      <p:sp>
+        <p:nvSpPr>
+          <p:cNvPr id="17" name="TextBox 16">
+            <a:extLst>
+              <a:ext uri="{FF2B5EF4-FFF2-40B4-BE49-F238E27FC236}">
+                <a16:creationId xmlns:a16="http://schemas.microsoft.com/office/drawing/2014/main" id="{1F5C2D1F-04DC-CBD6-5674-6024656D40A6}"/>
+              </a:ext>
+            </a:extLst>
+          </p:cNvPr>
+          <p:cNvSpPr txBox="1"/>
+          <p:nvPr/>
+        </p:nvSpPr>
+        <p:spPr>
+          <a:xfrm>
+            <a:off x="9481128" y="2591981"/>
+            <a:ext cx="988027" cy="461665"/>
+          </a:xfrm>
+          <a:prstGeom prst="rect">
+            <a:avLst/>
+          </a:prstGeom>
+          <a:noFill/>
+        </p:spPr>
+        <p:txBody>
+          <a:bodyPr wrap="none" rtlCol="0">
+            <a:spAutoFit/>
+          </a:bodyPr>
+          <a:lstStyle/>
+          <a:p>
+            <a:r>
+              <a:rPr lang="en-US" sz="1200" dirty="0"/>
+              <a:t>Read current</a:t>
+            </a:r>
+            <a:br>
+              <a:rPr lang="en-US" sz="1200" dirty="0"/>
+            </a:br>
+            <a:r>
+              <a:rPr lang="en-US" sz="1200" dirty="0"/>
+              <a:t>score</a:t>
+            </a:r>
+          </a:p>
+        </p:txBody>
+      </p:sp>
+    </p:spTree>
+    <p:extLst>
+      <p:ext uri="{BB962C8B-B14F-4D97-AF65-F5344CB8AC3E}">
+        <p14:creationId xmlns:p14="http://schemas.microsoft.com/office/powerpoint/2010/main" val="3184761484"/>
+      </p:ext>
+    </p:extLst>
+  </p:cSld>
+  <p:clrMapOvr>
+    <a:masterClrMapping/>
+  </p:clrMapOvr>
+</p:sld>
+</file>
+
+<file path=ppt/slides/slide5.xml><?xml version="1.0" encoding="utf-8"?>
+<p:sld xmlns:a="http://schemas.openxmlformats.org/drawingml/2006/main" xmlns:r="http://schemas.openxmlformats.org/officeDocument/2006/relationships" xmlns:p="http://schemas.openxmlformats.org/presentationml/2006/main">
+  <p:cSld>
+    <p:spTree>
+      <p:nvGrpSpPr>
+        <p:cNvPr id="1" name=""/>
+        <p:cNvGrpSpPr/>
+        <p:nvPr/>
+      </p:nvGrpSpPr>
+      <p:grpSpPr>
+        <a:xfrm>
+          <a:off x="0" y="0"/>
+          <a:ext cx="0" cy="0"/>
+          <a:chOff x="0" y="0"/>
+          <a:chExt cx="0" cy="0"/>
+        </a:xfrm>
+      </p:grpSpPr>
+      <p:sp>
+        <p:nvSpPr>
+          <p:cNvPr id="4" name="TextBox 3">
+            <a:extLst>
+              <a:ext uri="{FF2B5EF4-FFF2-40B4-BE49-F238E27FC236}">
+                <a16:creationId xmlns:a16="http://schemas.microsoft.com/office/drawing/2014/main" id="{BA24AE7D-97EF-BBFD-8F95-65FB6E309D5A}"/>
+              </a:ext>
+            </a:extLst>
+          </p:cNvPr>
+          <p:cNvSpPr txBox="1"/>
+          <p:nvPr/>
+        </p:nvSpPr>
+        <p:spPr>
+          <a:xfrm>
+            <a:off x="355198" y="151491"/>
+            <a:ext cx="3172920" cy="369332"/>
+          </a:xfrm>
+          <a:prstGeom prst="rect">
+            <a:avLst/>
+          </a:prstGeom>
+          <a:noFill/>
+        </p:spPr>
+        <p:txBody>
+          <a:bodyPr wrap="none" rtlCol="0">
+            <a:spAutoFit/>
+          </a:bodyPr>
+          <a:lstStyle/>
+          <a:p>
+            <a:r>
+              <a:rPr lang="en-US" b="1" dirty="0"/>
+              <a:t>Finite State Machine: Fire Laser</a:t>
+            </a:r>
+          </a:p>
+        </p:txBody>
+      </p:sp>
+      <p:sp>
+        <p:nvSpPr>
+          <p:cNvPr id="5" name="Rounded Rectangle 4">
+            <a:extLst>
+              <a:ext uri="{FF2B5EF4-FFF2-40B4-BE49-F238E27FC236}">
+                <a16:creationId xmlns:a16="http://schemas.microsoft.com/office/drawing/2014/main" id="{948BF349-D987-054D-7D60-1D6C098D52C8}"/>
               </a:ext>
             </a:extLst>
           </p:cNvPr>
@@ -6174,7 +6816,7 @@
         </p:nvSpPr>
         <p:spPr>
           <a:xfrm>
-            <a:off x="8446231" y="2860591"/>
+            <a:off x="3345319" y="2860592"/>
             <a:ext cx="2014566" cy="1136815"/>
           </a:xfrm>
           <a:prstGeom prst="roundRect">
@@ -6203,26 +6845,104 @@
             <a:pPr algn="ctr"/>
             <a:r>
               <a:rPr lang="en-US" sz="2000" dirty="0"/>
-              <a:t>State Name 4</a:t>
-            </a:r>
-          </a:p>
-          <a:p>
+              <a:t>Waiting</a:t>
+            </a:r>
             <a:endParaRPr lang="en-US" sz="1200" dirty="0"/>
           </a:p>
           <a:p>
             <a:r>
               <a:rPr lang="en-US" sz="1200" dirty="0"/>
-              <a:t>Description of action while in state.</a:t>
-            </a:r>
-          </a:p>
-        </p:txBody>
-      </p:sp>
-      <p:sp>
-        <p:nvSpPr>
-          <p:cNvPr id="14" name="Rounded Rectangle 13">
-            <a:extLst>
-              <a:ext uri="{FF2B5EF4-FFF2-40B4-BE49-F238E27FC236}">
-                <a16:creationId xmlns:a16="http://schemas.microsoft.com/office/drawing/2014/main" id="{6284E8C9-2EC6-5CC9-A414-40089A987D57}"/>
+              <a:t>Waiting for player to press the fire button </a:t>
+            </a:r>
+          </a:p>
+        </p:txBody>
+      </p:sp>
+      <p:cxnSp>
+        <p:nvCxnSpPr>
+          <p:cNvPr id="9" name="Straight Arrow Connector 8">
+            <a:extLst>
+              <a:ext uri="{FF2B5EF4-FFF2-40B4-BE49-F238E27FC236}">
+                <a16:creationId xmlns:a16="http://schemas.microsoft.com/office/drawing/2014/main" id="{C379F455-7089-EA43-FCAC-5D025263A1B8}"/>
+              </a:ext>
+            </a:extLst>
+          </p:cNvPr>
+          <p:cNvCxnSpPr>
+            <a:cxnSpLocks/>
+          </p:cNvCxnSpPr>
+          <p:nvPr/>
+        </p:nvCxnSpPr>
+        <p:spPr>
+          <a:xfrm>
+            <a:off x="3178963" y="2035404"/>
+            <a:ext cx="680712" cy="825188"/>
+          </a:xfrm>
+          <a:prstGeom prst="straightConnector1">
+            <a:avLst/>
+          </a:prstGeom>
+          <a:ln w="50800">
+            <a:solidFill>
+              <a:srgbClr val="FFC000"/>
+            </a:solidFill>
+            <a:prstDash val="solid"/>
+            <a:tailEnd type="triangle"/>
+          </a:ln>
+        </p:spPr>
+        <p:style>
+          <a:lnRef idx="1">
+            <a:schemeClr val="dk1"/>
+          </a:lnRef>
+          <a:fillRef idx="0">
+            <a:schemeClr val="dk1"/>
+          </a:fillRef>
+          <a:effectRef idx="0">
+            <a:schemeClr val="dk1"/>
+          </a:effectRef>
+          <a:fontRef idx="minor">
+            <a:schemeClr val="tx1"/>
+          </a:fontRef>
+        </p:style>
+      </p:cxnSp>
+      <p:sp>
+        <p:nvSpPr>
+          <p:cNvPr id="11" name="TextBox 10">
+            <a:extLst>
+              <a:ext uri="{FF2B5EF4-FFF2-40B4-BE49-F238E27FC236}">
+                <a16:creationId xmlns:a16="http://schemas.microsoft.com/office/drawing/2014/main" id="{909903AF-4BDA-FD86-E513-2EB44A65BCAF}"/>
+              </a:ext>
+            </a:extLst>
+          </p:cNvPr>
+          <p:cNvSpPr txBox="1"/>
+          <p:nvPr/>
+        </p:nvSpPr>
+        <p:spPr>
+          <a:xfrm>
+            <a:off x="2713030" y="2218654"/>
+            <a:ext cx="632289" cy="369332"/>
+          </a:xfrm>
+          <a:prstGeom prst="rect">
+            <a:avLst/>
+          </a:prstGeom>
+          <a:noFill/>
+        </p:spPr>
+        <p:txBody>
+          <a:bodyPr wrap="none" rtlCol="0">
+            <a:spAutoFit/>
+          </a:bodyPr>
+          <a:lstStyle/>
+          <a:p>
+            <a:r>
+              <a:rPr lang="en-US" dirty="0"/>
+              <a:t>Start</a:t>
+            </a:r>
+          </a:p>
+        </p:txBody>
+      </p:sp>
+      <p:sp>
+        <p:nvSpPr>
+          <p:cNvPr id="12" name="Rounded Rectangle 11">
+            <a:extLst>
+              <a:ext uri="{FF2B5EF4-FFF2-40B4-BE49-F238E27FC236}">
+                <a16:creationId xmlns:a16="http://schemas.microsoft.com/office/drawing/2014/main" id="{4D3F3AA8-3D36-BFFE-32E7-CDFACD4F19F6}"/>
               </a:ext>
             </a:extLst>
           </p:cNvPr>
@@ -6231,7 +6951,7 @@
         </p:nvSpPr>
         <p:spPr>
           <a:xfrm>
-            <a:off x="5088717" y="4639346"/>
+            <a:off x="6702831" y="1081839"/>
             <a:ext cx="2014566" cy="1136815"/>
           </a:xfrm>
           <a:prstGeom prst="roundRect">
@@ -6260,16 +6980,71 @@
             <a:pPr algn="ctr"/>
             <a:r>
               <a:rPr lang="en-US" sz="2000" dirty="0"/>
-              <a:t>State Name 3</a:t>
-            </a:r>
-          </a:p>
-          <a:p>
+              <a:t>Growing</a:t>
+            </a:r>
             <a:endParaRPr lang="en-US" sz="1200" dirty="0"/>
           </a:p>
           <a:p>
             <a:r>
               <a:rPr lang="en-US" sz="1200" dirty="0"/>
-              <a:t>Description of action while in state.</a:t>
+              <a:t>Laser extends from starting position to target</a:t>
+            </a:r>
+          </a:p>
+        </p:txBody>
+      </p:sp>
+      <p:sp>
+        <p:nvSpPr>
+          <p:cNvPr id="14" name="Rounded Rectangle 13">
+            <a:extLst>
+              <a:ext uri="{FF2B5EF4-FFF2-40B4-BE49-F238E27FC236}">
+                <a16:creationId xmlns:a16="http://schemas.microsoft.com/office/drawing/2014/main" id="{6284E8C9-2EC6-5CC9-A414-40089A987D57}"/>
+              </a:ext>
+            </a:extLst>
+          </p:cNvPr>
+          <p:cNvSpPr/>
+          <p:nvPr/>
+        </p:nvSpPr>
+        <p:spPr>
+          <a:xfrm>
+            <a:off x="6702831" y="4639346"/>
+            <a:ext cx="2014566" cy="1136815"/>
+          </a:xfrm>
+          <a:prstGeom prst="roundRect">
+            <a:avLst/>
+          </a:prstGeom>
+          <a:ln w="25400"/>
+        </p:spPr>
+        <p:style>
+          <a:lnRef idx="2">
+            <a:schemeClr val="accent2"/>
+          </a:lnRef>
+          <a:fillRef idx="1">
+            <a:schemeClr val="lt1"/>
+          </a:fillRef>
+          <a:effectRef idx="0">
+            <a:schemeClr val="accent2"/>
+          </a:effectRef>
+          <a:fontRef idx="minor">
+            <a:schemeClr val="dk1"/>
+          </a:fontRef>
+        </p:style>
+        <p:txBody>
+          <a:bodyPr rtlCol="0" anchor="t" anchorCtr="0"/>
+          <a:lstStyle/>
+          <a:p>
+            <a:pPr algn="ctr"/>
+            <a:r>
+              <a:rPr lang="en-US" sz="2000" dirty="0"/>
+              <a:t>Shrinking</a:t>
+            </a:r>
+          </a:p>
+          <a:p>
+            <a:endParaRPr lang="en-US" sz="1200" dirty="0"/>
+          </a:p>
+          <a:p>
+            <a:r>
+              <a:rPr lang="en-US" sz="1200" dirty="0"/>
+              <a:t>Laser shrinks towards target</a:t>
             </a:r>
           </a:p>
         </p:txBody>
@@ -6290,7 +7065,7 @@
         </p:nvCxnSpPr>
         <p:spPr>
           <a:xfrm flipV="1">
-            <a:off x="3745771" y="2187804"/>
+            <a:off x="5359885" y="2187804"/>
             <a:ext cx="1342946" cy="743932"/>
           </a:xfrm>
           <a:prstGeom prst="straightConnector1">
@@ -6334,9 +7109,9 @@
           <p:nvPr/>
         </p:nvCxnSpPr>
         <p:spPr>
-          <a:xfrm>
-            <a:off x="3745770" y="3936831"/>
-            <a:ext cx="1342947" cy="814278"/>
+          <a:xfrm flipH="1" flipV="1">
+            <a:off x="5307097" y="3926264"/>
+            <a:ext cx="1395734" cy="796811"/>
           </a:xfrm>
           <a:prstGeom prst="straightConnector1">
             <a:avLst/>
@@ -6378,8 +7153,8 @@
         </p:nvSpPr>
         <p:spPr>
           <a:xfrm>
-            <a:off x="3428840" y="4292262"/>
-            <a:ext cx="1123064" cy="738664"/>
+            <a:off x="4940784" y="4356508"/>
+            <a:ext cx="1101905" cy="523220"/>
           </a:xfrm>
           <a:prstGeom prst="rect">
             <a:avLst/>
@@ -6394,41 +7169,79 @@
           <a:p>
             <a:r>
               <a:rPr lang="en-US" sz="1400" dirty="0"/>
-              <a:t>Condition or</a:t>
-            </a:r>
-          </a:p>
-          <a:p>
-            <a:r>
+              <a:t>Laser length</a:t>
+            </a:r>
+            <a:br>
               <a:rPr lang="en-US" sz="1400" dirty="0"/>
-              <a:t>event causes</a:t>
-            </a:r>
-          </a:p>
-          <a:p>
+            </a:br>
             <a:r>
               <a:rPr lang="en-US" sz="1400" dirty="0"/>
-              <a:t>transition</a:t>
+              <a:t>reaches zero</a:t>
+            </a:r>
+          </a:p>
+        </p:txBody>
+      </p:sp>
+      <p:sp>
+        <p:nvSpPr>
+          <p:cNvPr id="25" name="TextBox 24">
+            <a:extLst>
+              <a:ext uri="{FF2B5EF4-FFF2-40B4-BE49-F238E27FC236}">
+                <a16:creationId xmlns:a16="http://schemas.microsoft.com/office/drawing/2014/main" id="{484B4C33-CE25-E19F-FF35-268FCBB91E61}"/>
+              </a:ext>
+            </a:extLst>
+          </p:cNvPr>
+          <p:cNvSpPr txBox="1"/>
+          <p:nvPr/>
+        </p:nvSpPr>
+        <p:spPr>
+          <a:xfrm>
+            <a:off x="4994774" y="1978271"/>
+            <a:ext cx="993926" cy="523220"/>
+          </a:xfrm>
+          <a:prstGeom prst="rect">
+            <a:avLst/>
+          </a:prstGeom>
+          <a:noFill/>
+        </p:spPr>
+        <p:txBody>
+          <a:bodyPr wrap="none" rtlCol="0">
+            <a:spAutoFit/>
+          </a:bodyPr>
+          <a:lstStyle/>
+          <a:p>
+            <a:r>
+              <a:rPr lang="en-US" sz="1400" dirty="0"/>
+              <a:t>Fire button</a:t>
+            </a:r>
+          </a:p>
+          <a:p>
+            <a:r>
+              <a:rPr lang="en-US" sz="1400" dirty="0"/>
+              <a:t>pressed</a:t>
             </a:r>
           </a:p>
         </p:txBody>
       </p:sp>
       <p:cxnSp>
         <p:nvCxnSpPr>
-          <p:cNvPr id="22" name="Straight Arrow Connector 21">
-            <a:extLst>
-              <a:ext uri="{FF2B5EF4-FFF2-40B4-BE49-F238E27FC236}">
-                <a16:creationId xmlns:a16="http://schemas.microsoft.com/office/drawing/2014/main" id="{54FBC9BB-0A9F-071D-F9DC-0A6B6FABCE61}"/>
+          <p:cNvPr id="26" name="Straight Arrow Connector 25">
+            <a:extLst>
+              <a:ext uri="{FF2B5EF4-FFF2-40B4-BE49-F238E27FC236}">
+                <a16:creationId xmlns:a16="http://schemas.microsoft.com/office/drawing/2014/main" id="{BF49A70E-3A39-3678-66C9-DE12207B0AC5}"/>
               </a:ext>
             </a:extLst>
           </p:cNvPr>
           <p:cNvCxnSpPr>
             <a:cxnSpLocks/>
+            <a:stCxn id="12" idx="2"/>
+            <a:endCxn id="14" idx="0"/>
           </p:cNvCxnSpPr>
           <p:nvPr/>
         </p:nvCxnSpPr>
         <p:spPr>
           <a:xfrm>
-            <a:off x="7042287" y="2301437"/>
-            <a:ext cx="1342946" cy="828261"/>
+            <a:off x="7710114" y="2218654"/>
+            <a:ext cx="0" cy="2420692"/>
           </a:xfrm>
           <a:prstGeom prst="straightConnector1">
             <a:avLst/>
@@ -6458,10 +7271,10 @@
       </p:cxnSp>
       <p:sp>
         <p:nvSpPr>
-          <p:cNvPr id="25" name="TextBox 24">
-            <a:extLst>
-              <a:ext uri="{FF2B5EF4-FFF2-40B4-BE49-F238E27FC236}">
-                <a16:creationId xmlns:a16="http://schemas.microsoft.com/office/drawing/2014/main" id="{484B4C33-CE25-E19F-FF35-268FCBB91E61}"/>
+          <p:cNvPr id="33" name="TextBox 32">
+            <a:extLst>
+              <a:ext uri="{FF2B5EF4-FFF2-40B4-BE49-F238E27FC236}">
+                <a16:creationId xmlns:a16="http://schemas.microsoft.com/office/drawing/2014/main" id="{140881F9-B865-4F0A-CF3C-666EFF14D845}"/>
               </a:ext>
             </a:extLst>
           </p:cNvPr>
@@ -6470,8 +7283,8 @@
         </p:nvSpPr>
         <p:spPr>
           <a:xfrm>
-            <a:off x="3380660" y="1978271"/>
-            <a:ext cx="1123064" cy="738664"/>
+            <a:off x="7772371" y="3167389"/>
+            <a:ext cx="1416222" cy="523220"/>
           </a:xfrm>
           <a:prstGeom prst="rect">
             <a:avLst/>
@@ -6486,252 +7299,13 @@
           <a:p>
             <a:r>
               <a:rPr lang="en-US" sz="1400" dirty="0"/>
-              <a:t>Condition or</a:t>
+              <a:t>Laser reaches</a:t>
             </a:r>
           </a:p>
           <a:p>
             <a:r>
               <a:rPr lang="en-US" sz="1400" dirty="0"/>
-              <a:t>event causes</a:t>
-            </a:r>
-          </a:p>
-          <a:p>
-            <a:r>
-              <a:rPr lang="en-US" sz="1400" dirty="0"/>
-              <a:t>transition</a:t>
-            </a:r>
-          </a:p>
-        </p:txBody>
-      </p:sp>
-      <p:cxnSp>
-        <p:nvCxnSpPr>
-          <p:cNvPr id="26" name="Straight Arrow Connector 25">
-            <a:extLst>
-              <a:ext uri="{FF2B5EF4-FFF2-40B4-BE49-F238E27FC236}">
-                <a16:creationId xmlns:a16="http://schemas.microsoft.com/office/drawing/2014/main" id="{BF49A70E-3A39-3678-66C9-DE12207B0AC5}"/>
-              </a:ext>
-            </a:extLst>
-          </p:cNvPr>
-          <p:cNvCxnSpPr>
-            <a:cxnSpLocks/>
-            <a:stCxn id="14" idx="0"/>
-            <a:endCxn id="12" idx="2"/>
-          </p:cNvCxnSpPr>
-          <p:nvPr/>
-        </p:nvCxnSpPr>
-        <p:spPr>
-          <a:xfrm flipV="1">
-            <a:off x="6096000" y="2218654"/>
-            <a:ext cx="0" cy="2420692"/>
-          </a:xfrm>
-          <a:prstGeom prst="straightConnector1">
-            <a:avLst/>
-          </a:prstGeom>
-          <a:ln w="50800">
-            <a:solidFill>
-              <a:srgbClr val="FFC000"/>
-            </a:solidFill>
-            <a:prstDash val="solid"/>
-            <a:tailEnd type="triangle"/>
-          </a:ln>
-        </p:spPr>
-        <p:style>
-          <a:lnRef idx="1">
-            <a:schemeClr val="dk1"/>
-          </a:lnRef>
-          <a:fillRef idx="0">
-            <a:schemeClr val="dk1"/>
-          </a:fillRef>
-          <a:effectRef idx="0">
-            <a:schemeClr val="dk1"/>
-          </a:effectRef>
-          <a:fontRef idx="minor">
-            <a:schemeClr val="tx1"/>
-          </a:fontRef>
-        </p:style>
-      </p:cxnSp>
-      <p:cxnSp>
-        <p:nvCxnSpPr>
-          <p:cNvPr id="29" name="Straight Arrow Connector 28">
-            <a:extLst>
-              <a:ext uri="{FF2B5EF4-FFF2-40B4-BE49-F238E27FC236}">
-                <a16:creationId xmlns:a16="http://schemas.microsoft.com/office/drawing/2014/main" id="{246EBB56-9850-3514-A037-F44AA10E7277}"/>
-              </a:ext>
-            </a:extLst>
-          </p:cNvPr>
-          <p:cNvCxnSpPr>
-            <a:cxnSpLocks/>
-          </p:cNvCxnSpPr>
-          <p:nvPr/>
-        </p:nvCxnSpPr>
-        <p:spPr>
-          <a:xfrm flipH="1" flipV="1">
-            <a:off x="7237327" y="1650246"/>
-            <a:ext cx="1736991" cy="1127923"/>
-          </a:xfrm>
-          <a:prstGeom prst="straightConnector1">
-            <a:avLst/>
-          </a:prstGeom>
-          <a:ln w="50800">
-            <a:solidFill>
-              <a:srgbClr val="FFC000"/>
-            </a:solidFill>
-            <a:prstDash val="solid"/>
-            <a:tailEnd type="triangle"/>
-          </a:ln>
-        </p:spPr>
-        <p:style>
-          <a:lnRef idx="1">
-            <a:schemeClr val="dk1"/>
-          </a:lnRef>
-          <a:fillRef idx="0">
-            <a:schemeClr val="dk1"/>
-          </a:fillRef>
-          <a:effectRef idx="0">
-            <a:schemeClr val="dk1"/>
-          </a:effectRef>
-          <a:fontRef idx="minor">
-            <a:schemeClr val="tx1"/>
-          </a:fontRef>
-        </p:style>
-      </p:cxnSp>
-      <p:sp>
-        <p:nvSpPr>
-          <p:cNvPr id="33" name="TextBox 32">
-            <a:extLst>
-              <a:ext uri="{FF2B5EF4-FFF2-40B4-BE49-F238E27FC236}">
-                <a16:creationId xmlns:a16="http://schemas.microsoft.com/office/drawing/2014/main" id="{140881F9-B865-4F0A-CF3C-666EFF14D845}"/>
-              </a:ext>
-            </a:extLst>
-          </p:cNvPr>
-          <p:cNvSpPr txBox="1"/>
-          <p:nvPr/>
-        </p:nvSpPr>
-        <p:spPr>
-          <a:xfrm>
-            <a:off x="4989415" y="3045258"/>
-            <a:ext cx="1123064" cy="738664"/>
-          </a:xfrm>
-          <a:prstGeom prst="rect">
-            <a:avLst/>
-          </a:prstGeom>
-          <a:noFill/>
-        </p:spPr>
-        <p:txBody>
-          <a:bodyPr wrap="none" rtlCol="0">
-            <a:spAutoFit/>
-          </a:bodyPr>
-          <a:lstStyle/>
-          <a:p>
-            <a:r>
-              <a:rPr lang="en-US" sz="1400" dirty="0"/>
-              <a:t>Condition or</a:t>
-            </a:r>
-          </a:p>
-          <a:p>
-            <a:r>
-              <a:rPr lang="en-US" sz="1400" dirty="0"/>
-              <a:t>event causes</a:t>
-            </a:r>
-          </a:p>
-          <a:p>
-            <a:r>
-              <a:rPr lang="en-US" sz="1400" dirty="0"/>
-              <a:t>transition</a:t>
-            </a:r>
-          </a:p>
-        </p:txBody>
-      </p:sp>
-      <p:sp>
-        <p:nvSpPr>
-          <p:cNvPr id="34" name="TextBox 33">
-            <a:extLst>
-              <a:ext uri="{FF2B5EF4-FFF2-40B4-BE49-F238E27FC236}">
-                <a16:creationId xmlns:a16="http://schemas.microsoft.com/office/drawing/2014/main" id="{ECAFD697-AB5B-577D-8C72-6B376D36C132}"/>
-              </a:ext>
-            </a:extLst>
-          </p:cNvPr>
-          <p:cNvSpPr txBox="1"/>
-          <p:nvPr/>
-        </p:nvSpPr>
-        <p:spPr>
-          <a:xfrm>
-            <a:off x="8062773" y="1541473"/>
-            <a:ext cx="1123064" cy="738664"/>
-          </a:xfrm>
-          <a:prstGeom prst="rect">
-            <a:avLst/>
-          </a:prstGeom>
-          <a:noFill/>
-        </p:spPr>
-        <p:txBody>
-          <a:bodyPr wrap="none" rtlCol="0">
-            <a:spAutoFit/>
-          </a:bodyPr>
-          <a:lstStyle/>
-          <a:p>
-            <a:r>
-              <a:rPr lang="en-US" sz="1400" dirty="0"/>
-              <a:t>Condition or</a:t>
-            </a:r>
-          </a:p>
-          <a:p>
-            <a:r>
-              <a:rPr lang="en-US" sz="1400" dirty="0"/>
-              <a:t>event causes</a:t>
-            </a:r>
-          </a:p>
-          <a:p>
-            <a:r>
-              <a:rPr lang="en-US" sz="1400" dirty="0"/>
-              <a:t>transition</a:t>
-            </a:r>
-          </a:p>
-        </p:txBody>
-      </p:sp>
-      <p:sp>
-        <p:nvSpPr>
-          <p:cNvPr id="35" name="TextBox 34">
-            <a:extLst>
-              <a:ext uri="{FF2B5EF4-FFF2-40B4-BE49-F238E27FC236}">
-                <a16:creationId xmlns:a16="http://schemas.microsoft.com/office/drawing/2014/main" id="{CFD0B0BA-F2F8-8BB2-AB07-6BCF9165C9D2}"/>
-              </a:ext>
-            </a:extLst>
-          </p:cNvPr>
-          <p:cNvSpPr txBox="1"/>
-          <p:nvPr/>
-        </p:nvSpPr>
-        <p:spPr>
-          <a:xfrm>
-            <a:off x="6688834" y="2715567"/>
-            <a:ext cx="1123064" cy="738664"/>
-          </a:xfrm>
-          <a:prstGeom prst="rect">
-            <a:avLst/>
-          </a:prstGeom>
-          <a:noFill/>
-        </p:spPr>
-        <p:txBody>
-          <a:bodyPr wrap="none" rtlCol="0">
-            <a:spAutoFit/>
-          </a:bodyPr>
-          <a:lstStyle/>
-          <a:p>
-            <a:r>
-              <a:rPr lang="en-US" sz="1400" dirty="0"/>
-              <a:t>Condition or</a:t>
-            </a:r>
-          </a:p>
-          <a:p>
-            <a:r>
-              <a:rPr lang="en-US" sz="1400" dirty="0"/>
-              <a:t>event causes</a:t>
-            </a:r>
-          </a:p>
-          <a:p>
-            <a:r>
-              <a:rPr lang="en-US" sz="1400" dirty="0"/>
-              <a:t>transition</a:t>
+              <a:t>maximum length</a:t>
             </a:r>
           </a:p>
         </p:txBody>
@@ -6739,7 +7313,7 @@
     </p:spTree>
     <p:extLst>
       <p:ext uri="{BB962C8B-B14F-4D97-AF65-F5344CB8AC3E}">
-        <p14:creationId xmlns:p14="http://schemas.microsoft.com/office/powerpoint/2010/main" val="779645640"/>
+        <p14:creationId xmlns:p14="http://schemas.microsoft.com/office/powerpoint/2010/main" val="3105992848"/>
       </p:ext>
     </p:extLst>
   </p:cSld>

</xml_diff>